<commit_message>
start work on redoing the data -> sound wave diagram
</commit_message>
<xml_diff>
--- a/book_contents/ch04_data/01_anatomy_of_post/speaker diagram.pptx
+++ b/book_contents/ch04_data/01_anatomy_of_post/speaker diagram.pptx
@@ -7,6 +7,8 @@
   <p:sldIdLst>
     <p:sldId id="256" r:id="rId2"/>
     <p:sldId id="257" r:id="rId3"/>
+    <p:sldId id="258" r:id="rId4"/>
+    <p:sldId id="259" r:id="rId5"/>
   </p:sldIdLst>
   <p:sldSz cx="12192000" cy="6858000"/>
   <p:notesSz cx="6858000" cy="9144000"/>
@@ -260,7 +262,7 @@
           <a:p>
             <a:fld id="{6AE22105-B8EF-4FBB-BAA0-3834F2FF81D4}" type="datetimeFigureOut">
               <a:rPr lang="en-US" smtClean="0"/>
-              <a:t>1/5/2023</a:t>
+              <a:t>1/13/2025</a:t>
             </a:fld>
             <a:endParaRPr lang="en-US"/>
           </a:p>
@@ -458,7 +460,7 @@
           <a:p>
             <a:fld id="{6AE22105-B8EF-4FBB-BAA0-3834F2FF81D4}" type="datetimeFigureOut">
               <a:rPr lang="en-US" smtClean="0"/>
-              <a:t>1/5/2023</a:t>
+              <a:t>1/13/2025</a:t>
             </a:fld>
             <a:endParaRPr lang="en-US"/>
           </a:p>
@@ -666,7 +668,7 @@
           <a:p>
             <a:fld id="{6AE22105-B8EF-4FBB-BAA0-3834F2FF81D4}" type="datetimeFigureOut">
               <a:rPr lang="en-US" smtClean="0"/>
-              <a:t>1/5/2023</a:t>
+              <a:t>1/13/2025</a:t>
             </a:fld>
             <a:endParaRPr lang="en-US"/>
           </a:p>
@@ -864,7 +866,7 @@
           <a:p>
             <a:fld id="{6AE22105-B8EF-4FBB-BAA0-3834F2FF81D4}" type="datetimeFigureOut">
               <a:rPr lang="en-US" smtClean="0"/>
-              <a:t>1/5/2023</a:t>
+              <a:t>1/13/2025</a:t>
             </a:fld>
             <a:endParaRPr lang="en-US"/>
           </a:p>
@@ -1139,7 +1141,7 @@
           <a:p>
             <a:fld id="{6AE22105-B8EF-4FBB-BAA0-3834F2FF81D4}" type="datetimeFigureOut">
               <a:rPr lang="en-US" smtClean="0"/>
-              <a:t>1/5/2023</a:t>
+              <a:t>1/13/2025</a:t>
             </a:fld>
             <a:endParaRPr lang="en-US"/>
           </a:p>
@@ -1404,7 +1406,7 @@
           <a:p>
             <a:fld id="{6AE22105-B8EF-4FBB-BAA0-3834F2FF81D4}" type="datetimeFigureOut">
               <a:rPr lang="en-US" smtClean="0"/>
-              <a:t>1/5/2023</a:t>
+              <a:t>1/13/2025</a:t>
             </a:fld>
             <a:endParaRPr lang="en-US"/>
           </a:p>
@@ -1816,7 +1818,7 @@
           <a:p>
             <a:fld id="{6AE22105-B8EF-4FBB-BAA0-3834F2FF81D4}" type="datetimeFigureOut">
               <a:rPr lang="en-US" smtClean="0"/>
-              <a:t>1/5/2023</a:t>
+              <a:t>1/13/2025</a:t>
             </a:fld>
             <a:endParaRPr lang="en-US"/>
           </a:p>
@@ -1957,7 +1959,7 @@
           <a:p>
             <a:fld id="{6AE22105-B8EF-4FBB-BAA0-3834F2FF81D4}" type="datetimeFigureOut">
               <a:rPr lang="en-US" smtClean="0"/>
-              <a:t>1/5/2023</a:t>
+              <a:t>1/13/2025</a:t>
             </a:fld>
             <a:endParaRPr lang="en-US"/>
           </a:p>
@@ -2070,7 +2072,7 @@
           <a:p>
             <a:fld id="{6AE22105-B8EF-4FBB-BAA0-3834F2FF81D4}" type="datetimeFigureOut">
               <a:rPr lang="en-US" smtClean="0"/>
-              <a:t>1/5/2023</a:t>
+              <a:t>1/13/2025</a:t>
             </a:fld>
             <a:endParaRPr lang="en-US"/>
           </a:p>
@@ -2381,7 +2383,7 @@
           <a:p>
             <a:fld id="{6AE22105-B8EF-4FBB-BAA0-3834F2FF81D4}" type="datetimeFigureOut">
               <a:rPr lang="en-US" smtClean="0"/>
-              <a:t>1/5/2023</a:t>
+              <a:t>1/13/2025</a:t>
             </a:fld>
             <a:endParaRPr lang="en-US"/>
           </a:p>
@@ -2669,7 +2671,7 @@
           <a:p>
             <a:fld id="{6AE22105-B8EF-4FBB-BAA0-3834F2FF81D4}" type="datetimeFigureOut">
               <a:rPr lang="en-US" smtClean="0"/>
-              <a:t>1/5/2023</a:t>
+              <a:t>1/13/2025</a:t>
             </a:fld>
             <a:endParaRPr lang="en-US"/>
           </a:p>
@@ -2910,7 +2912,7 @@
           <a:p>
             <a:fld id="{6AE22105-B8EF-4FBB-BAA0-3834F2FF81D4}" type="datetimeFigureOut">
               <a:rPr lang="en-US" smtClean="0"/>
-              <a:t>1/5/2023</a:t>
+              <a:t>1/13/2025</a:t>
             </a:fld>
             <a:endParaRPr lang="en-US"/>
           </a:p>
@@ -4232,6 +4234,2440 @@
 </p:sld>
 </file>
 
+<file path=ppt/slides/slide3.xml><?xml version="1.0" encoding="utf-8"?>
+<p:sld xmlns:a="http://schemas.openxmlformats.org/drawingml/2006/main" xmlns:r="http://schemas.openxmlformats.org/officeDocument/2006/relationships" xmlns:p="http://schemas.openxmlformats.org/presentationml/2006/main">
+  <p:cSld>
+    <p:spTree>
+      <p:nvGrpSpPr>
+        <p:cNvPr id="1" name=""/>
+        <p:cNvGrpSpPr/>
+        <p:nvPr/>
+      </p:nvGrpSpPr>
+      <p:grpSpPr>
+        <a:xfrm>
+          <a:off x="0" y="0"/>
+          <a:ext cx="0" cy="0"/>
+          <a:chOff x="0" y="0"/>
+          <a:chExt cx="0" cy="0"/>
+        </a:xfrm>
+      </p:grpSpPr>
+      <p:pic>
+        <p:nvPicPr>
+          <p:cNvPr id="5" name="Picture 4" descr="Icon&#10;&#10;Description automatically generated">
+            <a:extLst>
+              <a:ext uri="{FF2B5EF4-FFF2-40B4-BE49-F238E27FC236}">
+                <a16:creationId xmlns:a16="http://schemas.microsoft.com/office/drawing/2014/main" id="{CE1050FE-7829-5987-4B9F-38839F51B96B}"/>
+              </a:ext>
+            </a:extLst>
+          </p:cNvPr>
+          <p:cNvPicPr>
+            <a:picLocks noChangeAspect="1"/>
+          </p:cNvPicPr>
+          <p:nvPr/>
+        </p:nvPicPr>
+        <p:blipFill rotWithShape="1">
+          <a:blip r:embed="rId2">
+            <a:extLst>
+              <a:ext uri="{28A0092B-C50C-407E-A947-70E740481C1C}">
+                <a14:useLocalDpi xmlns:a14="http://schemas.microsoft.com/office/drawing/2010/main" val="0"/>
+              </a:ext>
+            </a:extLst>
+          </a:blip>
+          <a:srcRect r="18277"/>
+          <a:stretch/>
+        </p:blipFill>
+        <p:spPr>
+          <a:xfrm rot="10800000" flipV="1">
+            <a:off x="2044553" y="1416165"/>
+            <a:ext cx="4184741" cy="3968496"/>
+          </a:xfrm>
+          <a:prstGeom prst="rect">
+            <a:avLst/>
+          </a:prstGeom>
+        </p:spPr>
+      </p:pic>
+      <p:pic>
+        <p:nvPicPr>
+          <p:cNvPr id="6" name="Picture 5" descr="Icon&#10;&#10;Description automatically generated">
+            <a:extLst>
+              <a:ext uri="{FF2B5EF4-FFF2-40B4-BE49-F238E27FC236}">
+                <a16:creationId xmlns:a16="http://schemas.microsoft.com/office/drawing/2014/main" id="{AA645185-85E2-A6C9-AF1E-AE5E0AB60A8B}"/>
+              </a:ext>
+            </a:extLst>
+          </p:cNvPr>
+          <p:cNvPicPr>
+            <a:picLocks noChangeAspect="1"/>
+          </p:cNvPicPr>
+          <p:nvPr/>
+        </p:nvPicPr>
+        <p:blipFill rotWithShape="1">
+          <a:blip r:embed="rId2">
+            <a:extLst>
+              <a:ext uri="{28A0092B-C50C-407E-A947-70E740481C1C}">
+                <a14:useLocalDpi xmlns:a14="http://schemas.microsoft.com/office/drawing/2010/main" val="0"/>
+              </a:ext>
+            </a:extLst>
+          </a:blip>
+          <a:srcRect l="82084" t="-623" r="-2949" b="623"/>
+          <a:stretch/>
+        </p:blipFill>
+        <p:spPr>
+          <a:xfrm rot="10800000">
+            <a:off x="756231" y="1318448"/>
+            <a:ext cx="1097280" cy="4075591"/>
+          </a:xfrm>
+          <a:prstGeom prst="rect">
+            <a:avLst/>
+          </a:prstGeom>
+        </p:spPr>
+      </p:pic>
+      <p:sp>
+        <p:nvSpPr>
+          <p:cNvPr id="7" name="Rectangle 6">
+            <a:extLst>
+              <a:ext uri="{FF2B5EF4-FFF2-40B4-BE49-F238E27FC236}">
+                <a16:creationId xmlns:a16="http://schemas.microsoft.com/office/drawing/2014/main" id="{3146EFB0-F7BC-AC58-25EF-DC55F81DF1F9}"/>
+              </a:ext>
+            </a:extLst>
+          </p:cNvPr>
+          <p:cNvSpPr/>
+          <p:nvPr/>
+        </p:nvSpPr>
+        <p:spPr>
+          <a:xfrm>
+            <a:off x="7620000" y="2001520"/>
+            <a:ext cx="4023360" cy="2600960"/>
+          </a:xfrm>
+          <a:prstGeom prst="rect">
+            <a:avLst/>
+          </a:prstGeom>
+          <a:noFill/>
+          <a:ln w="38100"/>
+        </p:spPr>
+        <p:style>
+          <a:lnRef idx="2">
+            <a:schemeClr val="accent1">
+              <a:shade val="15000"/>
+            </a:schemeClr>
+          </a:lnRef>
+          <a:fillRef idx="1">
+            <a:schemeClr val="accent1"/>
+          </a:fillRef>
+          <a:effectRef idx="0">
+            <a:schemeClr val="accent1"/>
+          </a:effectRef>
+          <a:fontRef idx="minor">
+            <a:schemeClr val="lt1"/>
+          </a:fontRef>
+        </p:style>
+        <p:txBody>
+          <a:bodyPr rtlCol="0" anchor="ctr"/>
+          <a:lstStyle/>
+          <a:p>
+            <a:pPr algn="ctr"/>
+            <a:endParaRPr lang="en-US"/>
+          </a:p>
+        </p:txBody>
+      </p:sp>
+      <p:sp>
+        <p:nvSpPr>
+          <p:cNvPr id="8" name="Freeform: Shape 7">
+            <a:extLst>
+              <a:ext uri="{FF2B5EF4-FFF2-40B4-BE49-F238E27FC236}">
+                <a16:creationId xmlns:a16="http://schemas.microsoft.com/office/drawing/2014/main" id="{A72B6F81-62A5-B4DF-4502-A493F6E948E8}"/>
+              </a:ext>
+            </a:extLst>
+          </p:cNvPr>
+          <p:cNvSpPr/>
+          <p:nvPr/>
+        </p:nvSpPr>
+        <p:spPr>
+          <a:xfrm>
+            <a:off x="7630160" y="2021771"/>
+            <a:ext cx="3972560" cy="2611188"/>
+          </a:xfrm>
+          <a:custGeom>
+            <a:avLst/>
+            <a:gdLst>
+              <a:gd name="connsiteX0" fmla="*/ 0 w 3992880"/>
+              <a:gd name="connsiteY0" fmla="*/ 2529843 h 2636428"/>
+              <a:gd name="connsiteX1" fmla="*/ 355600 w 3992880"/>
+              <a:gd name="connsiteY1" fmla="*/ 2346963 h 2636428"/>
+              <a:gd name="connsiteX2" fmla="*/ 1320800 w 3992880"/>
+              <a:gd name="connsiteY2" fmla="*/ 60963 h 2636428"/>
+              <a:gd name="connsiteX3" fmla="*/ 2367280 w 3992880"/>
+              <a:gd name="connsiteY3" fmla="*/ 2631443 h 2636428"/>
+              <a:gd name="connsiteX4" fmla="*/ 3444240 w 3992880"/>
+              <a:gd name="connsiteY4" fmla="*/ 3 h 2636428"/>
+              <a:gd name="connsiteX5" fmla="*/ 3992880 w 3992880"/>
+              <a:gd name="connsiteY5" fmla="*/ 2611123 h 2636428"/>
+              <a:gd name="connsiteX6" fmla="*/ 3992880 w 3992880"/>
+              <a:gd name="connsiteY6" fmla="*/ 2611123 h 2636428"/>
+              <a:gd name="connsiteX0" fmla="*/ 0 w 3972560"/>
+              <a:gd name="connsiteY0" fmla="*/ 2306323 h 2631473"/>
+              <a:gd name="connsiteX1" fmla="*/ 335280 w 3972560"/>
+              <a:gd name="connsiteY1" fmla="*/ 2346963 h 2631473"/>
+              <a:gd name="connsiteX2" fmla="*/ 1300480 w 3972560"/>
+              <a:gd name="connsiteY2" fmla="*/ 60963 h 2631473"/>
+              <a:gd name="connsiteX3" fmla="*/ 2346960 w 3972560"/>
+              <a:gd name="connsiteY3" fmla="*/ 2631443 h 2631473"/>
+              <a:gd name="connsiteX4" fmla="*/ 3423920 w 3972560"/>
+              <a:gd name="connsiteY4" fmla="*/ 3 h 2631473"/>
+              <a:gd name="connsiteX5" fmla="*/ 3972560 w 3972560"/>
+              <a:gd name="connsiteY5" fmla="*/ 2611123 h 2631473"/>
+              <a:gd name="connsiteX6" fmla="*/ 3972560 w 3972560"/>
+              <a:gd name="connsiteY6" fmla="*/ 2611123 h 2631473"/>
+              <a:gd name="connsiteX0" fmla="*/ 0 w 3972560"/>
+              <a:gd name="connsiteY0" fmla="*/ 2306388 h 2611188"/>
+              <a:gd name="connsiteX1" fmla="*/ 335280 w 3972560"/>
+              <a:gd name="connsiteY1" fmla="*/ 2347028 h 2611188"/>
+              <a:gd name="connsiteX2" fmla="*/ 1300480 w 3972560"/>
+              <a:gd name="connsiteY2" fmla="*/ 61028 h 2611188"/>
+              <a:gd name="connsiteX3" fmla="*/ 2346960 w 3972560"/>
+              <a:gd name="connsiteY3" fmla="*/ 2519748 h 2611188"/>
+              <a:gd name="connsiteX4" fmla="*/ 3423920 w 3972560"/>
+              <a:gd name="connsiteY4" fmla="*/ 68 h 2611188"/>
+              <a:gd name="connsiteX5" fmla="*/ 3972560 w 3972560"/>
+              <a:gd name="connsiteY5" fmla="*/ 2611188 h 2611188"/>
+              <a:gd name="connsiteX6" fmla="*/ 3972560 w 3972560"/>
+              <a:gd name="connsiteY6" fmla="*/ 2611188 h 2611188"/>
+              <a:gd name="connsiteX0" fmla="*/ 0 w 3972560"/>
+              <a:gd name="connsiteY0" fmla="*/ 2306388 h 2611188"/>
+              <a:gd name="connsiteX1" fmla="*/ 335280 w 3972560"/>
+              <a:gd name="connsiteY1" fmla="*/ 2347028 h 2611188"/>
+              <a:gd name="connsiteX2" fmla="*/ 1300480 w 3972560"/>
+              <a:gd name="connsiteY2" fmla="*/ 61028 h 2611188"/>
+              <a:gd name="connsiteX3" fmla="*/ 2346960 w 3972560"/>
+              <a:gd name="connsiteY3" fmla="*/ 2519748 h 2611188"/>
+              <a:gd name="connsiteX4" fmla="*/ 3423920 w 3972560"/>
+              <a:gd name="connsiteY4" fmla="*/ 68 h 2611188"/>
+              <a:gd name="connsiteX5" fmla="*/ 3972560 w 3972560"/>
+              <a:gd name="connsiteY5" fmla="*/ 2611188 h 2611188"/>
+              <a:gd name="connsiteX6" fmla="*/ 3962400 w 3972560"/>
+              <a:gd name="connsiteY6" fmla="*/ 2550228 h 2611188"/>
+            </a:gdLst>
+            <a:ahLst/>
+            <a:cxnLst>
+              <a:cxn ang="0">
+                <a:pos x="connsiteX0" y="connsiteY0"/>
+              </a:cxn>
+              <a:cxn ang="0">
+                <a:pos x="connsiteX1" y="connsiteY1"/>
+              </a:cxn>
+              <a:cxn ang="0">
+                <a:pos x="connsiteX2" y="connsiteY2"/>
+              </a:cxn>
+              <a:cxn ang="0">
+                <a:pos x="connsiteX3" y="connsiteY3"/>
+              </a:cxn>
+              <a:cxn ang="0">
+                <a:pos x="connsiteX4" y="connsiteY4"/>
+              </a:cxn>
+              <a:cxn ang="0">
+                <a:pos x="connsiteX5" y="connsiteY5"/>
+              </a:cxn>
+              <a:cxn ang="0">
+                <a:pos x="connsiteX6" y="connsiteY6"/>
+              </a:cxn>
+            </a:cxnLst>
+            <a:rect l="l" t="t" r="r" b="b"/>
+            <a:pathLst>
+              <a:path w="3972560" h="2611188">
+                <a:moveTo>
+                  <a:pt x="0" y="2306388"/>
+                </a:moveTo>
+                <a:cubicBezTo>
+                  <a:pt x="67733" y="2420688"/>
+                  <a:pt x="118533" y="2721255"/>
+                  <a:pt x="335280" y="2347028"/>
+                </a:cubicBezTo>
+                <a:cubicBezTo>
+                  <a:pt x="552027" y="1972801"/>
+                  <a:pt x="965200" y="32241"/>
+                  <a:pt x="1300480" y="61028"/>
+                </a:cubicBezTo>
+                <a:cubicBezTo>
+                  <a:pt x="1635760" y="89815"/>
+                  <a:pt x="1993054" y="2529908"/>
+                  <a:pt x="2346960" y="2519748"/>
+                </a:cubicBezTo>
+                <a:cubicBezTo>
+                  <a:pt x="2700866" y="2509588"/>
+                  <a:pt x="3152987" y="-15172"/>
+                  <a:pt x="3423920" y="68"/>
+                </a:cubicBezTo>
+                <a:cubicBezTo>
+                  <a:pt x="3694853" y="15308"/>
+                  <a:pt x="3972560" y="2611188"/>
+                  <a:pt x="3972560" y="2611188"/>
+                </a:cubicBezTo>
+                <a:lnTo>
+                  <a:pt x="3962400" y="2550228"/>
+                </a:lnTo>
+              </a:path>
+            </a:pathLst>
+          </a:custGeom>
+          <a:noFill/>
+          <a:ln w="25400">
+            <a:solidFill>
+              <a:schemeClr val="accent1"/>
+            </a:solidFill>
+          </a:ln>
+        </p:spPr>
+        <p:style>
+          <a:lnRef idx="2">
+            <a:schemeClr val="accent1">
+              <a:shade val="15000"/>
+            </a:schemeClr>
+          </a:lnRef>
+          <a:fillRef idx="1">
+            <a:schemeClr val="accent1"/>
+          </a:fillRef>
+          <a:effectRef idx="0">
+            <a:schemeClr val="accent1"/>
+          </a:effectRef>
+          <a:fontRef idx="minor">
+            <a:schemeClr val="lt1"/>
+          </a:fontRef>
+        </p:style>
+        <p:txBody>
+          <a:bodyPr rtlCol="0" anchor="ctr"/>
+          <a:lstStyle/>
+          <a:p>
+            <a:pPr algn="ctr"/>
+            <a:endParaRPr lang="en-US"/>
+          </a:p>
+        </p:txBody>
+      </p:sp>
+      <p:cxnSp>
+        <p:nvCxnSpPr>
+          <p:cNvPr id="10" name="Straight Connector 9">
+            <a:extLst>
+              <a:ext uri="{FF2B5EF4-FFF2-40B4-BE49-F238E27FC236}">
+                <a16:creationId xmlns:a16="http://schemas.microsoft.com/office/drawing/2014/main" id="{E74F8A06-03BC-6D9A-322A-8F044690C9FE}"/>
+              </a:ext>
+            </a:extLst>
+          </p:cNvPr>
+          <p:cNvCxnSpPr>
+            <a:stCxn id="7" idx="1"/>
+            <a:endCxn id="7" idx="3"/>
+          </p:cNvCxnSpPr>
+          <p:nvPr/>
+        </p:nvCxnSpPr>
+        <p:spPr>
+          <a:xfrm>
+            <a:off x="7620000" y="3302000"/>
+            <a:ext cx="4023360" cy="0"/>
+          </a:xfrm>
+          <a:prstGeom prst="line">
+            <a:avLst/>
+          </a:prstGeom>
+          <a:ln w="44450">
+            <a:solidFill>
+              <a:schemeClr val="tx1">
+                <a:alpha val="40000"/>
+              </a:schemeClr>
+            </a:solidFill>
+            <a:prstDash val="dash"/>
+          </a:ln>
+        </p:spPr>
+        <p:style>
+          <a:lnRef idx="1">
+            <a:schemeClr val="accent1"/>
+          </a:lnRef>
+          <a:fillRef idx="0">
+            <a:schemeClr val="accent1"/>
+          </a:fillRef>
+          <a:effectRef idx="0">
+            <a:schemeClr val="accent1"/>
+          </a:effectRef>
+          <a:fontRef idx="minor">
+            <a:schemeClr val="tx1"/>
+          </a:fontRef>
+        </p:style>
+      </p:cxnSp>
+      <p:sp>
+        <p:nvSpPr>
+          <p:cNvPr id="11" name="Freeform: Shape 10">
+            <a:extLst>
+              <a:ext uri="{FF2B5EF4-FFF2-40B4-BE49-F238E27FC236}">
+                <a16:creationId xmlns:a16="http://schemas.microsoft.com/office/drawing/2014/main" id="{1E3BA818-00F8-3F13-B7F5-8F0CE6FDB9FC}"/>
+              </a:ext>
+            </a:extLst>
+          </p:cNvPr>
+          <p:cNvSpPr/>
+          <p:nvPr/>
+        </p:nvSpPr>
+        <p:spPr>
+          <a:xfrm>
+            <a:off x="4370468" y="1503680"/>
+            <a:ext cx="3239372" cy="3484880"/>
+          </a:xfrm>
+          <a:custGeom>
+            <a:avLst/>
+            <a:gdLst>
+              <a:gd name="connsiteX0" fmla="*/ 3158092 w 3239372"/>
+              <a:gd name="connsiteY0" fmla="*/ 589280 h 3484880"/>
+              <a:gd name="connsiteX1" fmla="*/ 3168252 w 3239372"/>
+              <a:gd name="connsiteY1" fmla="*/ 762000 h 3484880"/>
+              <a:gd name="connsiteX2" fmla="*/ 3147932 w 3239372"/>
+              <a:gd name="connsiteY2" fmla="*/ 975360 h 3484880"/>
+              <a:gd name="connsiteX3" fmla="*/ 3127612 w 3239372"/>
+              <a:gd name="connsiteY3" fmla="*/ 1188720 h 3484880"/>
+              <a:gd name="connsiteX4" fmla="*/ 3208892 w 3239372"/>
+              <a:gd name="connsiteY4" fmla="*/ 1737360 h 3484880"/>
+              <a:gd name="connsiteX5" fmla="*/ 3208892 w 3239372"/>
+              <a:gd name="connsiteY5" fmla="*/ 1910080 h 3484880"/>
+              <a:gd name="connsiteX6" fmla="*/ 3219052 w 3239372"/>
+              <a:gd name="connsiteY6" fmla="*/ 2499360 h 3484880"/>
+              <a:gd name="connsiteX7" fmla="*/ 3229212 w 3239372"/>
+              <a:gd name="connsiteY7" fmla="*/ 2570480 h 3484880"/>
+              <a:gd name="connsiteX8" fmla="*/ 3239372 w 3239372"/>
+              <a:gd name="connsiteY8" fmla="*/ 2661920 h 3484880"/>
+              <a:gd name="connsiteX9" fmla="*/ 3229212 w 3239372"/>
+              <a:gd name="connsiteY9" fmla="*/ 3017520 h 3484880"/>
+              <a:gd name="connsiteX10" fmla="*/ 3219052 w 3239372"/>
+              <a:gd name="connsiteY10" fmla="*/ 3068320 h 3484880"/>
+              <a:gd name="connsiteX11" fmla="*/ 3188572 w 3239372"/>
+              <a:gd name="connsiteY11" fmla="*/ 3098800 h 3484880"/>
+              <a:gd name="connsiteX12" fmla="*/ 3168252 w 3239372"/>
+              <a:gd name="connsiteY12" fmla="*/ 3159760 h 3484880"/>
+              <a:gd name="connsiteX13" fmla="*/ 3086972 w 3239372"/>
+              <a:gd name="connsiteY13" fmla="*/ 3261360 h 3484880"/>
+              <a:gd name="connsiteX14" fmla="*/ 2985372 w 3239372"/>
+              <a:gd name="connsiteY14" fmla="*/ 3281680 h 3484880"/>
+              <a:gd name="connsiteX15" fmla="*/ 2944732 w 3239372"/>
+              <a:gd name="connsiteY15" fmla="*/ 3302000 h 3484880"/>
+              <a:gd name="connsiteX16" fmla="*/ 2711052 w 3239372"/>
+              <a:gd name="connsiteY16" fmla="*/ 3332480 h 3484880"/>
+              <a:gd name="connsiteX17" fmla="*/ 2101452 w 3239372"/>
+              <a:gd name="connsiteY17" fmla="*/ 3362960 h 3484880"/>
+              <a:gd name="connsiteX18" fmla="*/ 2060812 w 3239372"/>
+              <a:gd name="connsiteY18" fmla="*/ 3373120 h 3484880"/>
+              <a:gd name="connsiteX19" fmla="*/ 1867772 w 3239372"/>
+              <a:gd name="connsiteY19" fmla="*/ 3413760 h 3484880"/>
+              <a:gd name="connsiteX20" fmla="*/ 1735692 w 3239372"/>
+              <a:gd name="connsiteY20" fmla="*/ 3464560 h 3484880"/>
+              <a:gd name="connsiteX21" fmla="*/ 1644252 w 3239372"/>
+              <a:gd name="connsiteY21" fmla="*/ 3484880 h 3484880"/>
+              <a:gd name="connsiteX22" fmla="*/ 1441052 w 3239372"/>
+              <a:gd name="connsiteY22" fmla="*/ 3434080 h 3484880"/>
+              <a:gd name="connsiteX23" fmla="*/ 1237852 w 3239372"/>
+              <a:gd name="connsiteY23" fmla="*/ 3342640 h 3484880"/>
+              <a:gd name="connsiteX24" fmla="*/ 1166732 w 3239372"/>
+              <a:gd name="connsiteY24" fmla="*/ 3312160 h 3484880"/>
+              <a:gd name="connsiteX25" fmla="*/ 1065132 w 3239372"/>
+              <a:gd name="connsiteY25" fmla="*/ 3281680 h 3484880"/>
+              <a:gd name="connsiteX26" fmla="*/ 963532 w 3239372"/>
+              <a:gd name="connsiteY26" fmla="*/ 3251200 h 3484880"/>
+              <a:gd name="connsiteX27" fmla="*/ 912732 w 3239372"/>
+              <a:gd name="connsiteY27" fmla="*/ 3230880 h 3484880"/>
+              <a:gd name="connsiteX28" fmla="*/ 821292 w 3239372"/>
+              <a:gd name="connsiteY28" fmla="*/ 3220720 h 3484880"/>
+              <a:gd name="connsiteX29" fmla="*/ 790812 w 3239372"/>
+              <a:gd name="connsiteY29" fmla="*/ 3200400 h 3484880"/>
+              <a:gd name="connsiteX30" fmla="*/ 750172 w 3239372"/>
+              <a:gd name="connsiteY30" fmla="*/ 3169920 h 3484880"/>
+              <a:gd name="connsiteX31" fmla="*/ 699372 w 3239372"/>
+              <a:gd name="connsiteY31" fmla="*/ 3149600 h 3484880"/>
+              <a:gd name="connsiteX32" fmla="*/ 618092 w 3239372"/>
+              <a:gd name="connsiteY32" fmla="*/ 3078480 h 3484880"/>
+              <a:gd name="connsiteX33" fmla="*/ 597772 w 3239372"/>
+              <a:gd name="connsiteY33" fmla="*/ 3037840 h 3484880"/>
+              <a:gd name="connsiteX34" fmla="*/ 597772 w 3239372"/>
+              <a:gd name="connsiteY34" fmla="*/ 2865120 h 3484880"/>
+              <a:gd name="connsiteX35" fmla="*/ 638412 w 3239372"/>
+              <a:gd name="connsiteY35" fmla="*/ 2824480 h 3484880"/>
+              <a:gd name="connsiteX36" fmla="*/ 679052 w 3239372"/>
+              <a:gd name="connsiteY36" fmla="*/ 2753360 h 3484880"/>
+              <a:gd name="connsiteX37" fmla="*/ 709532 w 3239372"/>
+              <a:gd name="connsiteY37" fmla="*/ 2682240 h 3484880"/>
+              <a:gd name="connsiteX38" fmla="*/ 750172 w 3239372"/>
+              <a:gd name="connsiteY38" fmla="*/ 2529840 h 3484880"/>
+              <a:gd name="connsiteX39" fmla="*/ 790812 w 3239372"/>
+              <a:gd name="connsiteY39" fmla="*/ 2418080 h 3484880"/>
+              <a:gd name="connsiteX40" fmla="*/ 821292 w 3239372"/>
+              <a:gd name="connsiteY40" fmla="*/ 2377440 h 3484880"/>
+              <a:gd name="connsiteX41" fmla="*/ 861932 w 3239372"/>
+              <a:gd name="connsiteY41" fmla="*/ 2275840 h 3484880"/>
+              <a:gd name="connsiteX42" fmla="*/ 841612 w 3239372"/>
+              <a:gd name="connsiteY42" fmla="*/ 1971040 h 3484880"/>
+              <a:gd name="connsiteX43" fmla="*/ 800972 w 3239372"/>
+              <a:gd name="connsiteY43" fmla="*/ 1869440 h 3484880"/>
+              <a:gd name="connsiteX44" fmla="*/ 780652 w 3239372"/>
+              <a:gd name="connsiteY44" fmla="*/ 1818640 h 3484880"/>
+              <a:gd name="connsiteX45" fmla="*/ 709532 w 3239372"/>
+              <a:gd name="connsiteY45" fmla="*/ 1686560 h 3484880"/>
+              <a:gd name="connsiteX46" fmla="*/ 679052 w 3239372"/>
+              <a:gd name="connsiteY46" fmla="*/ 1666240 h 3484880"/>
+              <a:gd name="connsiteX47" fmla="*/ 496172 w 3239372"/>
+              <a:gd name="connsiteY47" fmla="*/ 1666240 h 3484880"/>
+              <a:gd name="connsiteX48" fmla="*/ 455532 w 3239372"/>
+              <a:gd name="connsiteY48" fmla="*/ 1727200 h 3484880"/>
+              <a:gd name="connsiteX49" fmla="*/ 475852 w 3239372"/>
+              <a:gd name="connsiteY49" fmla="*/ 1828800 h 3484880"/>
+              <a:gd name="connsiteX50" fmla="*/ 516492 w 3239372"/>
+              <a:gd name="connsiteY50" fmla="*/ 1889760 h 3484880"/>
+              <a:gd name="connsiteX51" fmla="*/ 557132 w 3239372"/>
+              <a:gd name="connsiteY51" fmla="*/ 1960880 h 3484880"/>
+              <a:gd name="connsiteX52" fmla="*/ 577452 w 3239372"/>
+              <a:gd name="connsiteY52" fmla="*/ 2001520 h 3484880"/>
+              <a:gd name="connsiteX53" fmla="*/ 607932 w 3239372"/>
+              <a:gd name="connsiteY53" fmla="*/ 2032000 h 3484880"/>
+              <a:gd name="connsiteX54" fmla="*/ 628252 w 3239372"/>
+              <a:gd name="connsiteY54" fmla="*/ 2072640 h 3484880"/>
+              <a:gd name="connsiteX55" fmla="*/ 699372 w 3239372"/>
+              <a:gd name="connsiteY55" fmla="*/ 2092960 h 3484880"/>
+              <a:gd name="connsiteX56" fmla="*/ 800972 w 3239372"/>
+              <a:gd name="connsiteY56" fmla="*/ 2052320 h 3484880"/>
+              <a:gd name="connsiteX57" fmla="*/ 902572 w 3239372"/>
+              <a:gd name="connsiteY57" fmla="*/ 1910080 h 3484880"/>
+              <a:gd name="connsiteX58" fmla="*/ 933052 w 3239372"/>
+              <a:gd name="connsiteY58" fmla="*/ 1808480 h 3484880"/>
+              <a:gd name="connsiteX59" fmla="*/ 933052 w 3239372"/>
+              <a:gd name="connsiteY59" fmla="*/ 1625600 h 3484880"/>
+              <a:gd name="connsiteX60" fmla="*/ 882252 w 3239372"/>
+              <a:gd name="connsiteY60" fmla="*/ 1534160 h 3484880"/>
+              <a:gd name="connsiteX61" fmla="*/ 861932 w 3239372"/>
+              <a:gd name="connsiteY61" fmla="*/ 1503680 h 3484880"/>
+              <a:gd name="connsiteX62" fmla="*/ 790812 w 3239372"/>
+              <a:gd name="connsiteY62" fmla="*/ 1524000 h 3484880"/>
+              <a:gd name="connsiteX63" fmla="*/ 750172 w 3239372"/>
+              <a:gd name="connsiteY63" fmla="*/ 1544320 h 3484880"/>
+              <a:gd name="connsiteX64" fmla="*/ 699372 w 3239372"/>
+              <a:gd name="connsiteY64" fmla="*/ 1554480 h 3484880"/>
+              <a:gd name="connsiteX65" fmla="*/ 618092 w 3239372"/>
+              <a:gd name="connsiteY65" fmla="*/ 1574800 h 3484880"/>
+              <a:gd name="connsiteX66" fmla="*/ 577452 w 3239372"/>
+              <a:gd name="connsiteY66" fmla="*/ 1605280 h 3484880"/>
+              <a:gd name="connsiteX67" fmla="*/ 526652 w 3239372"/>
+              <a:gd name="connsiteY67" fmla="*/ 1615440 h 3484880"/>
+              <a:gd name="connsiteX68" fmla="*/ 435212 w 3239372"/>
+              <a:gd name="connsiteY68" fmla="*/ 1686560 h 3484880"/>
+              <a:gd name="connsiteX69" fmla="*/ 394572 w 3239372"/>
+              <a:gd name="connsiteY69" fmla="*/ 1737360 h 3484880"/>
+              <a:gd name="connsiteX70" fmla="*/ 343772 w 3239372"/>
+              <a:gd name="connsiteY70" fmla="*/ 1818640 h 3484880"/>
+              <a:gd name="connsiteX71" fmla="*/ 374252 w 3239372"/>
+              <a:gd name="connsiteY71" fmla="*/ 2072640 h 3484880"/>
+              <a:gd name="connsiteX72" fmla="*/ 414892 w 3239372"/>
+              <a:gd name="connsiteY72" fmla="*/ 2143760 h 3484880"/>
+              <a:gd name="connsiteX73" fmla="*/ 455532 w 3239372"/>
+              <a:gd name="connsiteY73" fmla="*/ 2164080 h 3484880"/>
+              <a:gd name="connsiteX74" fmla="*/ 506332 w 3239372"/>
+              <a:gd name="connsiteY74" fmla="*/ 2153920 h 3484880"/>
+              <a:gd name="connsiteX75" fmla="*/ 516492 w 3239372"/>
+              <a:gd name="connsiteY75" fmla="*/ 2123440 h 3484880"/>
+              <a:gd name="connsiteX76" fmla="*/ 557132 w 3239372"/>
+              <a:gd name="connsiteY76" fmla="*/ 2032000 h 3484880"/>
+              <a:gd name="connsiteX77" fmla="*/ 658732 w 3239372"/>
+              <a:gd name="connsiteY77" fmla="*/ 1717040 h 3484880"/>
+              <a:gd name="connsiteX78" fmla="*/ 618092 w 3239372"/>
+              <a:gd name="connsiteY78" fmla="*/ 1534160 h 3484880"/>
+              <a:gd name="connsiteX79" fmla="*/ 577452 w 3239372"/>
+              <a:gd name="connsiteY79" fmla="*/ 1524000 h 3484880"/>
+              <a:gd name="connsiteX80" fmla="*/ 394572 w 3239372"/>
+              <a:gd name="connsiteY80" fmla="*/ 1554480 h 3484880"/>
+              <a:gd name="connsiteX81" fmla="*/ 364092 w 3239372"/>
+              <a:gd name="connsiteY81" fmla="*/ 1564640 h 3484880"/>
+              <a:gd name="connsiteX82" fmla="*/ 323452 w 3239372"/>
+              <a:gd name="connsiteY82" fmla="*/ 1584960 h 3484880"/>
+              <a:gd name="connsiteX83" fmla="*/ 292972 w 3239372"/>
+              <a:gd name="connsiteY83" fmla="*/ 1605280 h 3484880"/>
+              <a:gd name="connsiteX84" fmla="*/ 232012 w 3239372"/>
+              <a:gd name="connsiteY84" fmla="*/ 1666240 h 3484880"/>
+              <a:gd name="connsiteX85" fmla="*/ 211692 w 3239372"/>
+              <a:gd name="connsiteY85" fmla="*/ 1706880 h 3484880"/>
+              <a:gd name="connsiteX86" fmla="*/ 171052 w 3239372"/>
+              <a:gd name="connsiteY86" fmla="*/ 1808480 h 3484880"/>
+              <a:gd name="connsiteX87" fmla="*/ 211692 w 3239372"/>
+              <a:gd name="connsiteY87" fmla="*/ 2103120 h 3484880"/>
+              <a:gd name="connsiteX88" fmla="*/ 282812 w 3239372"/>
+              <a:gd name="connsiteY88" fmla="*/ 2123440 h 3484880"/>
+              <a:gd name="connsiteX89" fmla="*/ 364092 w 3239372"/>
+              <a:gd name="connsiteY89" fmla="*/ 2092960 h 3484880"/>
+              <a:gd name="connsiteX90" fmla="*/ 414892 w 3239372"/>
+              <a:gd name="connsiteY90" fmla="*/ 2011680 h 3484880"/>
+              <a:gd name="connsiteX91" fmla="*/ 435212 w 3239372"/>
+              <a:gd name="connsiteY91" fmla="*/ 1971040 h 3484880"/>
+              <a:gd name="connsiteX92" fmla="*/ 465692 w 3239372"/>
+              <a:gd name="connsiteY92" fmla="*/ 1920240 h 3484880"/>
+              <a:gd name="connsiteX93" fmla="*/ 486012 w 3239372"/>
+              <a:gd name="connsiteY93" fmla="*/ 1727200 h 3484880"/>
+              <a:gd name="connsiteX94" fmla="*/ 475852 w 3239372"/>
+              <a:gd name="connsiteY94" fmla="*/ 1605280 h 3484880"/>
+              <a:gd name="connsiteX95" fmla="*/ 414892 w 3239372"/>
+              <a:gd name="connsiteY95" fmla="*/ 1544320 h 3484880"/>
+              <a:gd name="connsiteX96" fmla="*/ 374252 w 3239372"/>
+              <a:gd name="connsiteY96" fmla="*/ 1513840 h 3484880"/>
+              <a:gd name="connsiteX97" fmla="*/ 211692 w 3239372"/>
+              <a:gd name="connsiteY97" fmla="*/ 1534160 h 3484880"/>
+              <a:gd name="connsiteX98" fmla="*/ 181212 w 3239372"/>
+              <a:gd name="connsiteY98" fmla="*/ 1554480 h 3484880"/>
+              <a:gd name="connsiteX99" fmla="*/ 130412 w 3239372"/>
+              <a:gd name="connsiteY99" fmla="*/ 1595120 h 3484880"/>
+              <a:gd name="connsiteX100" fmla="*/ 89772 w 3239372"/>
+              <a:gd name="connsiteY100" fmla="*/ 1666240 h 3484880"/>
+              <a:gd name="connsiteX101" fmla="*/ 69452 w 3239372"/>
+              <a:gd name="connsiteY101" fmla="*/ 1706880 h 3484880"/>
+              <a:gd name="connsiteX102" fmla="*/ 28812 w 3239372"/>
+              <a:gd name="connsiteY102" fmla="*/ 1767840 h 3484880"/>
+              <a:gd name="connsiteX103" fmla="*/ 18652 w 3239372"/>
+              <a:gd name="connsiteY103" fmla="*/ 2042160 h 3484880"/>
+              <a:gd name="connsiteX104" fmla="*/ 49132 w 3239372"/>
+              <a:gd name="connsiteY104" fmla="*/ 2062480 h 3484880"/>
+              <a:gd name="connsiteX105" fmla="*/ 59292 w 3239372"/>
+              <a:gd name="connsiteY105" fmla="*/ 2092960 h 3484880"/>
+              <a:gd name="connsiteX106" fmla="*/ 150732 w 3239372"/>
+              <a:gd name="connsiteY106" fmla="*/ 2072640 h 3484880"/>
+              <a:gd name="connsiteX107" fmla="*/ 201532 w 3239372"/>
+              <a:gd name="connsiteY107" fmla="*/ 1940560 h 3484880"/>
+              <a:gd name="connsiteX108" fmla="*/ 242172 w 3239372"/>
+              <a:gd name="connsiteY108" fmla="*/ 1838960 h 3484880"/>
+              <a:gd name="connsiteX109" fmla="*/ 272652 w 3239372"/>
+              <a:gd name="connsiteY109" fmla="*/ 1788160 h 3484880"/>
+              <a:gd name="connsiteX110" fmla="*/ 252332 w 3239372"/>
+              <a:gd name="connsiteY110" fmla="*/ 1645920 h 3484880"/>
+              <a:gd name="connsiteX111" fmla="*/ 242172 w 3239372"/>
+              <a:gd name="connsiteY111" fmla="*/ 1605280 h 3484880"/>
+              <a:gd name="connsiteX112" fmla="*/ 221852 w 3239372"/>
+              <a:gd name="connsiteY112" fmla="*/ 1574800 h 3484880"/>
+              <a:gd name="connsiteX113" fmla="*/ 201532 w 3239372"/>
+              <a:gd name="connsiteY113" fmla="*/ 1534160 h 3484880"/>
+              <a:gd name="connsiteX114" fmla="*/ 181212 w 3239372"/>
+              <a:gd name="connsiteY114" fmla="*/ 1483360 h 3484880"/>
+              <a:gd name="connsiteX115" fmla="*/ 150732 w 3239372"/>
+              <a:gd name="connsiteY115" fmla="*/ 1442720 h 3484880"/>
+              <a:gd name="connsiteX116" fmla="*/ 130412 w 3239372"/>
+              <a:gd name="connsiteY116" fmla="*/ 1402080 h 3484880"/>
+              <a:gd name="connsiteX117" fmla="*/ 150732 w 3239372"/>
+              <a:gd name="connsiteY117" fmla="*/ 1239520 h 3484880"/>
+              <a:gd name="connsiteX118" fmla="*/ 171052 w 3239372"/>
+              <a:gd name="connsiteY118" fmla="*/ 1188720 h 3484880"/>
+              <a:gd name="connsiteX119" fmla="*/ 282812 w 3239372"/>
+              <a:gd name="connsiteY119" fmla="*/ 1107440 h 3484880"/>
+              <a:gd name="connsiteX120" fmla="*/ 404732 w 3239372"/>
+              <a:gd name="connsiteY120" fmla="*/ 934720 h 3484880"/>
+              <a:gd name="connsiteX121" fmla="*/ 455532 w 3239372"/>
+              <a:gd name="connsiteY121" fmla="*/ 873760 h 3484880"/>
+              <a:gd name="connsiteX122" fmla="*/ 546972 w 3239372"/>
+              <a:gd name="connsiteY122" fmla="*/ 731520 h 3484880"/>
+              <a:gd name="connsiteX123" fmla="*/ 689212 w 3239372"/>
+              <a:gd name="connsiteY123" fmla="*/ 568960 h 3484880"/>
+              <a:gd name="connsiteX124" fmla="*/ 740012 w 3239372"/>
+              <a:gd name="connsiteY124" fmla="*/ 579120 h 3484880"/>
+              <a:gd name="connsiteX125" fmla="*/ 811132 w 3239372"/>
+              <a:gd name="connsiteY125" fmla="*/ 548640 h 3484880"/>
+              <a:gd name="connsiteX126" fmla="*/ 922892 w 3239372"/>
+              <a:gd name="connsiteY126" fmla="*/ 457200 h 3484880"/>
+              <a:gd name="connsiteX127" fmla="*/ 1105772 w 3239372"/>
+              <a:gd name="connsiteY127" fmla="*/ 274320 h 3484880"/>
+              <a:gd name="connsiteX128" fmla="*/ 1288652 w 3239372"/>
+              <a:gd name="connsiteY128" fmla="*/ 213360 h 3484880"/>
+              <a:gd name="connsiteX129" fmla="*/ 1441052 w 3239372"/>
+              <a:gd name="connsiteY129" fmla="*/ 172720 h 3484880"/>
+              <a:gd name="connsiteX130" fmla="*/ 1786492 w 3239372"/>
+              <a:gd name="connsiteY130" fmla="*/ 0 h 3484880"/>
+              <a:gd name="connsiteX131" fmla="*/ 1918572 w 3239372"/>
+              <a:gd name="connsiteY131" fmla="*/ 10160 h 3484880"/>
+              <a:gd name="connsiteX132" fmla="*/ 1989692 w 3239372"/>
+              <a:gd name="connsiteY132" fmla="*/ 30480 h 3484880"/>
+              <a:gd name="connsiteX133" fmla="*/ 2050652 w 3239372"/>
+              <a:gd name="connsiteY133" fmla="*/ 40640 h 3484880"/>
+              <a:gd name="connsiteX134" fmla="*/ 2152252 w 3239372"/>
+              <a:gd name="connsiteY134" fmla="*/ 60960 h 3484880"/>
+              <a:gd name="connsiteX135" fmla="*/ 2314812 w 3239372"/>
+              <a:gd name="connsiteY135" fmla="*/ 132080 h 3484880"/>
+              <a:gd name="connsiteX136" fmla="*/ 2507852 w 3239372"/>
+              <a:gd name="connsiteY136" fmla="*/ 203200 h 3484880"/>
+              <a:gd name="connsiteX137" fmla="*/ 2619612 w 3239372"/>
+              <a:gd name="connsiteY137" fmla="*/ 243840 h 3484880"/>
+              <a:gd name="connsiteX138" fmla="*/ 2700892 w 3239372"/>
+              <a:gd name="connsiteY138" fmla="*/ 284480 h 3484880"/>
+              <a:gd name="connsiteX139" fmla="*/ 2802492 w 3239372"/>
+              <a:gd name="connsiteY139" fmla="*/ 345440 h 3484880"/>
+              <a:gd name="connsiteX140" fmla="*/ 2934572 w 3239372"/>
+              <a:gd name="connsiteY140" fmla="*/ 375920 h 3484880"/>
+              <a:gd name="connsiteX141" fmla="*/ 3036172 w 3239372"/>
+              <a:gd name="connsiteY141" fmla="*/ 416560 h 3484880"/>
+              <a:gd name="connsiteX142" fmla="*/ 3097132 w 3239372"/>
+              <a:gd name="connsiteY142" fmla="*/ 467360 h 3484880"/>
+              <a:gd name="connsiteX143" fmla="*/ 3137772 w 3239372"/>
+              <a:gd name="connsiteY143" fmla="*/ 518160 h 3484880"/>
+              <a:gd name="connsiteX144" fmla="*/ 3147932 w 3239372"/>
+              <a:gd name="connsiteY144" fmla="*/ 558800 h 3484880"/>
+              <a:gd name="connsiteX145" fmla="*/ 3158092 w 3239372"/>
+              <a:gd name="connsiteY145" fmla="*/ 640080 h 3484880"/>
+            </a:gdLst>
+            <a:ahLst/>
+            <a:cxnLst>
+              <a:cxn ang="0">
+                <a:pos x="connsiteX0" y="connsiteY0"/>
+              </a:cxn>
+              <a:cxn ang="0">
+                <a:pos x="connsiteX1" y="connsiteY1"/>
+              </a:cxn>
+              <a:cxn ang="0">
+                <a:pos x="connsiteX2" y="connsiteY2"/>
+              </a:cxn>
+              <a:cxn ang="0">
+                <a:pos x="connsiteX3" y="connsiteY3"/>
+              </a:cxn>
+              <a:cxn ang="0">
+                <a:pos x="connsiteX4" y="connsiteY4"/>
+              </a:cxn>
+              <a:cxn ang="0">
+                <a:pos x="connsiteX5" y="connsiteY5"/>
+              </a:cxn>
+              <a:cxn ang="0">
+                <a:pos x="connsiteX6" y="connsiteY6"/>
+              </a:cxn>
+              <a:cxn ang="0">
+                <a:pos x="connsiteX7" y="connsiteY7"/>
+              </a:cxn>
+              <a:cxn ang="0">
+                <a:pos x="connsiteX8" y="connsiteY8"/>
+              </a:cxn>
+              <a:cxn ang="0">
+                <a:pos x="connsiteX9" y="connsiteY9"/>
+              </a:cxn>
+              <a:cxn ang="0">
+                <a:pos x="connsiteX10" y="connsiteY10"/>
+              </a:cxn>
+              <a:cxn ang="0">
+                <a:pos x="connsiteX11" y="connsiteY11"/>
+              </a:cxn>
+              <a:cxn ang="0">
+                <a:pos x="connsiteX12" y="connsiteY12"/>
+              </a:cxn>
+              <a:cxn ang="0">
+                <a:pos x="connsiteX13" y="connsiteY13"/>
+              </a:cxn>
+              <a:cxn ang="0">
+                <a:pos x="connsiteX14" y="connsiteY14"/>
+              </a:cxn>
+              <a:cxn ang="0">
+                <a:pos x="connsiteX15" y="connsiteY15"/>
+              </a:cxn>
+              <a:cxn ang="0">
+                <a:pos x="connsiteX16" y="connsiteY16"/>
+              </a:cxn>
+              <a:cxn ang="0">
+                <a:pos x="connsiteX17" y="connsiteY17"/>
+              </a:cxn>
+              <a:cxn ang="0">
+                <a:pos x="connsiteX18" y="connsiteY18"/>
+              </a:cxn>
+              <a:cxn ang="0">
+                <a:pos x="connsiteX19" y="connsiteY19"/>
+              </a:cxn>
+              <a:cxn ang="0">
+                <a:pos x="connsiteX20" y="connsiteY20"/>
+              </a:cxn>
+              <a:cxn ang="0">
+                <a:pos x="connsiteX21" y="connsiteY21"/>
+              </a:cxn>
+              <a:cxn ang="0">
+                <a:pos x="connsiteX22" y="connsiteY22"/>
+              </a:cxn>
+              <a:cxn ang="0">
+                <a:pos x="connsiteX23" y="connsiteY23"/>
+              </a:cxn>
+              <a:cxn ang="0">
+                <a:pos x="connsiteX24" y="connsiteY24"/>
+              </a:cxn>
+              <a:cxn ang="0">
+                <a:pos x="connsiteX25" y="connsiteY25"/>
+              </a:cxn>
+              <a:cxn ang="0">
+                <a:pos x="connsiteX26" y="connsiteY26"/>
+              </a:cxn>
+              <a:cxn ang="0">
+                <a:pos x="connsiteX27" y="connsiteY27"/>
+              </a:cxn>
+              <a:cxn ang="0">
+                <a:pos x="connsiteX28" y="connsiteY28"/>
+              </a:cxn>
+              <a:cxn ang="0">
+                <a:pos x="connsiteX29" y="connsiteY29"/>
+              </a:cxn>
+              <a:cxn ang="0">
+                <a:pos x="connsiteX30" y="connsiteY30"/>
+              </a:cxn>
+              <a:cxn ang="0">
+                <a:pos x="connsiteX31" y="connsiteY31"/>
+              </a:cxn>
+              <a:cxn ang="0">
+                <a:pos x="connsiteX32" y="connsiteY32"/>
+              </a:cxn>
+              <a:cxn ang="0">
+                <a:pos x="connsiteX33" y="connsiteY33"/>
+              </a:cxn>
+              <a:cxn ang="0">
+                <a:pos x="connsiteX34" y="connsiteY34"/>
+              </a:cxn>
+              <a:cxn ang="0">
+                <a:pos x="connsiteX35" y="connsiteY35"/>
+              </a:cxn>
+              <a:cxn ang="0">
+                <a:pos x="connsiteX36" y="connsiteY36"/>
+              </a:cxn>
+              <a:cxn ang="0">
+                <a:pos x="connsiteX37" y="connsiteY37"/>
+              </a:cxn>
+              <a:cxn ang="0">
+                <a:pos x="connsiteX38" y="connsiteY38"/>
+              </a:cxn>
+              <a:cxn ang="0">
+                <a:pos x="connsiteX39" y="connsiteY39"/>
+              </a:cxn>
+              <a:cxn ang="0">
+                <a:pos x="connsiteX40" y="connsiteY40"/>
+              </a:cxn>
+              <a:cxn ang="0">
+                <a:pos x="connsiteX41" y="connsiteY41"/>
+              </a:cxn>
+              <a:cxn ang="0">
+                <a:pos x="connsiteX42" y="connsiteY42"/>
+              </a:cxn>
+              <a:cxn ang="0">
+                <a:pos x="connsiteX43" y="connsiteY43"/>
+              </a:cxn>
+              <a:cxn ang="0">
+                <a:pos x="connsiteX44" y="connsiteY44"/>
+              </a:cxn>
+              <a:cxn ang="0">
+                <a:pos x="connsiteX45" y="connsiteY45"/>
+              </a:cxn>
+              <a:cxn ang="0">
+                <a:pos x="connsiteX46" y="connsiteY46"/>
+              </a:cxn>
+              <a:cxn ang="0">
+                <a:pos x="connsiteX47" y="connsiteY47"/>
+              </a:cxn>
+              <a:cxn ang="0">
+                <a:pos x="connsiteX48" y="connsiteY48"/>
+              </a:cxn>
+              <a:cxn ang="0">
+                <a:pos x="connsiteX49" y="connsiteY49"/>
+              </a:cxn>
+              <a:cxn ang="0">
+                <a:pos x="connsiteX50" y="connsiteY50"/>
+              </a:cxn>
+              <a:cxn ang="0">
+                <a:pos x="connsiteX51" y="connsiteY51"/>
+              </a:cxn>
+              <a:cxn ang="0">
+                <a:pos x="connsiteX52" y="connsiteY52"/>
+              </a:cxn>
+              <a:cxn ang="0">
+                <a:pos x="connsiteX53" y="connsiteY53"/>
+              </a:cxn>
+              <a:cxn ang="0">
+                <a:pos x="connsiteX54" y="connsiteY54"/>
+              </a:cxn>
+              <a:cxn ang="0">
+                <a:pos x="connsiteX55" y="connsiteY55"/>
+              </a:cxn>
+              <a:cxn ang="0">
+                <a:pos x="connsiteX56" y="connsiteY56"/>
+              </a:cxn>
+              <a:cxn ang="0">
+                <a:pos x="connsiteX57" y="connsiteY57"/>
+              </a:cxn>
+              <a:cxn ang="0">
+                <a:pos x="connsiteX58" y="connsiteY58"/>
+              </a:cxn>
+              <a:cxn ang="0">
+                <a:pos x="connsiteX59" y="connsiteY59"/>
+              </a:cxn>
+              <a:cxn ang="0">
+                <a:pos x="connsiteX60" y="connsiteY60"/>
+              </a:cxn>
+              <a:cxn ang="0">
+                <a:pos x="connsiteX61" y="connsiteY61"/>
+              </a:cxn>
+              <a:cxn ang="0">
+                <a:pos x="connsiteX62" y="connsiteY62"/>
+              </a:cxn>
+              <a:cxn ang="0">
+                <a:pos x="connsiteX63" y="connsiteY63"/>
+              </a:cxn>
+              <a:cxn ang="0">
+                <a:pos x="connsiteX64" y="connsiteY64"/>
+              </a:cxn>
+              <a:cxn ang="0">
+                <a:pos x="connsiteX65" y="connsiteY65"/>
+              </a:cxn>
+              <a:cxn ang="0">
+                <a:pos x="connsiteX66" y="connsiteY66"/>
+              </a:cxn>
+              <a:cxn ang="0">
+                <a:pos x="connsiteX67" y="connsiteY67"/>
+              </a:cxn>
+              <a:cxn ang="0">
+                <a:pos x="connsiteX68" y="connsiteY68"/>
+              </a:cxn>
+              <a:cxn ang="0">
+                <a:pos x="connsiteX69" y="connsiteY69"/>
+              </a:cxn>
+              <a:cxn ang="0">
+                <a:pos x="connsiteX70" y="connsiteY70"/>
+              </a:cxn>
+              <a:cxn ang="0">
+                <a:pos x="connsiteX71" y="connsiteY71"/>
+              </a:cxn>
+              <a:cxn ang="0">
+                <a:pos x="connsiteX72" y="connsiteY72"/>
+              </a:cxn>
+              <a:cxn ang="0">
+                <a:pos x="connsiteX73" y="connsiteY73"/>
+              </a:cxn>
+              <a:cxn ang="0">
+                <a:pos x="connsiteX74" y="connsiteY74"/>
+              </a:cxn>
+              <a:cxn ang="0">
+                <a:pos x="connsiteX75" y="connsiteY75"/>
+              </a:cxn>
+              <a:cxn ang="0">
+                <a:pos x="connsiteX76" y="connsiteY76"/>
+              </a:cxn>
+              <a:cxn ang="0">
+                <a:pos x="connsiteX77" y="connsiteY77"/>
+              </a:cxn>
+              <a:cxn ang="0">
+                <a:pos x="connsiteX78" y="connsiteY78"/>
+              </a:cxn>
+              <a:cxn ang="0">
+                <a:pos x="connsiteX79" y="connsiteY79"/>
+              </a:cxn>
+              <a:cxn ang="0">
+                <a:pos x="connsiteX80" y="connsiteY80"/>
+              </a:cxn>
+              <a:cxn ang="0">
+                <a:pos x="connsiteX81" y="connsiteY81"/>
+              </a:cxn>
+              <a:cxn ang="0">
+                <a:pos x="connsiteX82" y="connsiteY82"/>
+              </a:cxn>
+              <a:cxn ang="0">
+                <a:pos x="connsiteX83" y="connsiteY83"/>
+              </a:cxn>
+              <a:cxn ang="0">
+                <a:pos x="connsiteX84" y="connsiteY84"/>
+              </a:cxn>
+              <a:cxn ang="0">
+                <a:pos x="connsiteX85" y="connsiteY85"/>
+              </a:cxn>
+              <a:cxn ang="0">
+                <a:pos x="connsiteX86" y="connsiteY86"/>
+              </a:cxn>
+              <a:cxn ang="0">
+                <a:pos x="connsiteX87" y="connsiteY87"/>
+              </a:cxn>
+              <a:cxn ang="0">
+                <a:pos x="connsiteX88" y="connsiteY88"/>
+              </a:cxn>
+              <a:cxn ang="0">
+                <a:pos x="connsiteX89" y="connsiteY89"/>
+              </a:cxn>
+              <a:cxn ang="0">
+                <a:pos x="connsiteX90" y="connsiteY90"/>
+              </a:cxn>
+              <a:cxn ang="0">
+                <a:pos x="connsiteX91" y="connsiteY91"/>
+              </a:cxn>
+              <a:cxn ang="0">
+                <a:pos x="connsiteX92" y="connsiteY92"/>
+              </a:cxn>
+              <a:cxn ang="0">
+                <a:pos x="connsiteX93" y="connsiteY93"/>
+              </a:cxn>
+              <a:cxn ang="0">
+                <a:pos x="connsiteX94" y="connsiteY94"/>
+              </a:cxn>
+              <a:cxn ang="0">
+                <a:pos x="connsiteX95" y="connsiteY95"/>
+              </a:cxn>
+              <a:cxn ang="0">
+                <a:pos x="connsiteX96" y="connsiteY96"/>
+              </a:cxn>
+              <a:cxn ang="0">
+                <a:pos x="connsiteX97" y="connsiteY97"/>
+              </a:cxn>
+              <a:cxn ang="0">
+                <a:pos x="connsiteX98" y="connsiteY98"/>
+              </a:cxn>
+              <a:cxn ang="0">
+                <a:pos x="connsiteX99" y="connsiteY99"/>
+              </a:cxn>
+              <a:cxn ang="0">
+                <a:pos x="connsiteX100" y="connsiteY100"/>
+              </a:cxn>
+              <a:cxn ang="0">
+                <a:pos x="connsiteX101" y="connsiteY101"/>
+              </a:cxn>
+              <a:cxn ang="0">
+                <a:pos x="connsiteX102" y="connsiteY102"/>
+              </a:cxn>
+              <a:cxn ang="0">
+                <a:pos x="connsiteX103" y="connsiteY103"/>
+              </a:cxn>
+              <a:cxn ang="0">
+                <a:pos x="connsiteX104" y="connsiteY104"/>
+              </a:cxn>
+              <a:cxn ang="0">
+                <a:pos x="connsiteX105" y="connsiteY105"/>
+              </a:cxn>
+              <a:cxn ang="0">
+                <a:pos x="connsiteX106" y="connsiteY106"/>
+              </a:cxn>
+              <a:cxn ang="0">
+                <a:pos x="connsiteX107" y="connsiteY107"/>
+              </a:cxn>
+              <a:cxn ang="0">
+                <a:pos x="connsiteX108" y="connsiteY108"/>
+              </a:cxn>
+              <a:cxn ang="0">
+                <a:pos x="connsiteX109" y="connsiteY109"/>
+              </a:cxn>
+              <a:cxn ang="0">
+                <a:pos x="connsiteX110" y="connsiteY110"/>
+              </a:cxn>
+              <a:cxn ang="0">
+                <a:pos x="connsiteX111" y="connsiteY111"/>
+              </a:cxn>
+              <a:cxn ang="0">
+                <a:pos x="connsiteX112" y="connsiteY112"/>
+              </a:cxn>
+              <a:cxn ang="0">
+                <a:pos x="connsiteX113" y="connsiteY113"/>
+              </a:cxn>
+              <a:cxn ang="0">
+                <a:pos x="connsiteX114" y="connsiteY114"/>
+              </a:cxn>
+              <a:cxn ang="0">
+                <a:pos x="connsiteX115" y="connsiteY115"/>
+              </a:cxn>
+              <a:cxn ang="0">
+                <a:pos x="connsiteX116" y="connsiteY116"/>
+              </a:cxn>
+              <a:cxn ang="0">
+                <a:pos x="connsiteX117" y="connsiteY117"/>
+              </a:cxn>
+              <a:cxn ang="0">
+                <a:pos x="connsiteX118" y="connsiteY118"/>
+              </a:cxn>
+              <a:cxn ang="0">
+                <a:pos x="connsiteX119" y="connsiteY119"/>
+              </a:cxn>
+              <a:cxn ang="0">
+                <a:pos x="connsiteX120" y="connsiteY120"/>
+              </a:cxn>
+              <a:cxn ang="0">
+                <a:pos x="connsiteX121" y="connsiteY121"/>
+              </a:cxn>
+              <a:cxn ang="0">
+                <a:pos x="connsiteX122" y="connsiteY122"/>
+              </a:cxn>
+              <a:cxn ang="0">
+                <a:pos x="connsiteX123" y="connsiteY123"/>
+              </a:cxn>
+              <a:cxn ang="0">
+                <a:pos x="connsiteX124" y="connsiteY124"/>
+              </a:cxn>
+              <a:cxn ang="0">
+                <a:pos x="connsiteX125" y="connsiteY125"/>
+              </a:cxn>
+              <a:cxn ang="0">
+                <a:pos x="connsiteX126" y="connsiteY126"/>
+              </a:cxn>
+              <a:cxn ang="0">
+                <a:pos x="connsiteX127" y="connsiteY127"/>
+              </a:cxn>
+              <a:cxn ang="0">
+                <a:pos x="connsiteX128" y="connsiteY128"/>
+              </a:cxn>
+              <a:cxn ang="0">
+                <a:pos x="connsiteX129" y="connsiteY129"/>
+              </a:cxn>
+              <a:cxn ang="0">
+                <a:pos x="connsiteX130" y="connsiteY130"/>
+              </a:cxn>
+              <a:cxn ang="0">
+                <a:pos x="connsiteX131" y="connsiteY131"/>
+              </a:cxn>
+              <a:cxn ang="0">
+                <a:pos x="connsiteX132" y="connsiteY132"/>
+              </a:cxn>
+              <a:cxn ang="0">
+                <a:pos x="connsiteX133" y="connsiteY133"/>
+              </a:cxn>
+              <a:cxn ang="0">
+                <a:pos x="connsiteX134" y="connsiteY134"/>
+              </a:cxn>
+              <a:cxn ang="0">
+                <a:pos x="connsiteX135" y="connsiteY135"/>
+              </a:cxn>
+              <a:cxn ang="0">
+                <a:pos x="connsiteX136" y="connsiteY136"/>
+              </a:cxn>
+              <a:cxn ang="0">
+                <a:pos x="connsiteX137" y="connsiteY137"/>
+              </a:cxn>
+              <a:cxn ang="0">
+                <a:pos x="connsiteX138" y="connsiteY138"/>
+              </a:cxn>
+              <a:cxn ang="0">
+                <a:pos x="connsiteX139" y="connsiteY139"/>
+              </a:cxn>
+              <a:cxn ang="0">
+                <a:pos x="connsiteX140" y="connsiteY140"/>
+              </a:cxn>
+              <a:cxn ang="0">
+                <a:pos x="connsiteX141" y="connsiteY141"/>
+              </a:cxn>
+              <a:cxn ang="0">
+                <a:pos x="connsiteX142" y="connsiteY142"/>
+              </a:cxn>
+              <a:cxn ang="0">
+                <a:pos x="connsiteX143" y="connsiteY143"/>
+              </a:cxn>
+              <a:cxn ang="0">
+                <a:pos x="connsiteX144" y="connsiteY144"/>
+              </a:cxn>
+              <a:cxn ang="0">
+                <a:pos x="connsiteX145" y="connsiteY145"/>
+              </a:cxn>
+            </a:cxnLst>
+            <a:rect l="l" t="t" r="r" b="b"/>
+            <a:pathLst>
+              <a:path w="3239372" h="3484880">
+                <a:moveTo>
+                  <a:pt x="3158092" y="589280"/>
+                </a:moveTo>
+                <a:cubicBezTo>
+                  <a:pt x="3161479" y="646853"/>
+                  <a:pt x="3169769" y="704347"/>
+                  <a:pt x="3168252" y="762000"/>
+                </a:cubicBezTo>
+                <a:cubicBezTo>
+                  <a:pt x="3166373" y="833417"/>
+                  <a:pt x="3154400" y="904212"/>
+                  <a:pt x="3147932" y="975360"/>
+                </a:cubicBezTo>
+                <a:cubicBezTo>
+                  <a:pt x="3128872" y="1185022"/>
+                  <a:pt x="3147053" y="1013748"/>
+                  <a:pt x="3127612" y="1188720"/>
+                </a:cubicBezTo>
+                <a:cubicBezTo>
+                  <a:pt x="3181140" y="1691887"/>
+                  <a:pt x="3115357" y="1519111"/>
+                  <a:pt x="3208892" y="1737360"/>
+                </a:cubicBezTo>
+                <a:cubicBezTo>
+                  <a:pt x="3232690" y="1903949"/>
+                  <a:pt x="3208892" y="1696852"/>
+                  <a:pt x="3208892" y="1910080"/>
+                </a:cubicBezTo>
+                <a:cubicBezTo>
+                  <a:pt x="3208892" y="2106536"/>
+                  <a:pt x="3213010" y="2302997"/>
+                  <a:pt x="3219052" y="2499360"/>
+                </a:cubicBezTo>
+                <a:cubicBezTo>
+                  <a:pt x="3219788" y="2523296"/>
+                  <a:pt x="3226242" y="2546718"/>
+                  <a:pt x="3229212" y="2570480"/>
+                </a:cubicBezTo>
+                <a:cubicBezTo>
+                  <a:pt x="3233016" y="2600911"/>
+                  <a:pt x="3235985" y="2631440"/>
+                  <a:pt x="3239372" y="2661920"/>
+                </a:cubicBezTo>
+                <a:cubicBezTo>
+                  <a:pt x="3235985" y="2780453"/>
+                  <a:pt x="3235134" y="2899086"/>
+                  <a:pt x="3229212" y="3017520"/>
+                </a:cubicBezTo>
+                <a:cubicBezTo>
+                  <a:pt x="3228350" y="3034767"/>
+                  <a:pt x="3226775" y="3052874"/>
+                  <a:pt x="3219052" y="3068320"/>
+                </a:cubicBezTo>
+                <a:cubicBezTo>
+                  <a:pt x="3212626" y="3081171"/>
+                  <a:pt x="3198732" y="3088640"/>
+                  <a:pt x="3188572" y="3098800"/>
+                </a:cubicBezTo>
+                <a:cubicBezTo>
+                  <a:pt x="3181799" y="3119120"/>
+                  <a:pt x="3177115" y="3140261"/>
+                  <a:pt x="3168252" y="3159760"/>
+                </a:cubicBezTo>
+                <a:cubicBezTo>
+                  <a:pt x="3151948" y="3195628"/>
+                  <a:pt x="3119603" y="3239606"/>
+                  <a:pt x="3086972" y="3261360"/>
+                </a:cubicBezTo>
+                <a:cubicBezTo>
+                  <a:pt x="3076868" y="3268096"/>
+                  <a:pt x="2985573" y="3281647"/>
+                  <a:pt x="2985372" y="3281680"/>
+                </a:cubicBezTo>
+                <a:cubicBezTo>
+                  <a:pt x="2971825" y="3288453"/>
+                  <a:pt x="2959366" y="3298098"/>
+                  <a:pt x="2944732" y="3302000"/>
+                </a:cubicBezTo>
+                <a:cubicBezTo>
+                  <a:pt x="2869092" y="3322171"/>
+                  <a:pt x="2788589" y="3327193"/>
+                  <a:pt x="2711052" y="3332480"/>
+                </a:cubicBezTo>
+                <a:cubicBezTo>
+                  <a:pt x="2364699" y="3356095"/>
+                  <a:pt x="2430247" y="3351217"/>
+                  <a:pt x="2101452" y="3362960"/>
+                </a:cubicBezTo>
+                <a:cubicBezTo>
+                  <a:pt x="2087905" y="3366347"/>
+                  <a:pt x="2074457" y="3370154"/>
+                  <a:pt x="2060812" y="3373120"/>
+                </a:cubicBezTo>
+                <a:lnTo>
+                  <a:pt x="1867772" y="3413760"/>
+                </a:lnTo>
+                <a:cubicBezTo>
+                  <a:pt x="1820563" y="3437364"/>
+                  <a:pt x="1794474" y="3452804"/>
+                  <a:pt x="1735692" y="3464560"/>
+                </a:cubicBezTo>
+                <a:cubicBezTo>
+                  <a:pt x="1671200" y="3477458"/>
+                  <a:pt x="1701645" y="3470532"/>
+                  <a:pt x="1644252" y="3484880"/>
+                </a:cubicBezTo>
+                <a:cubicBezTo>
+                  <a:pt x="1576519" y="3467947"/>
+                  <a:pt x="1506950" y="3457144"/>
+                  <a:pt x="1441052" y="3434080"/>
+                </a:cubicBezTo>
+                <a:cubicBezTo>
+                  <a:pt x="1370947" y="3409543"/>
+                  <a:pt x="1305726" y="3372806"/>
+                  <a:pt x="1237852" y="3342640"/>
+                </a:cubicBezTo>
+                <a:cubicBezTo>
+                  <a:pt x="1214283" y="3332165"/>
+                  <a:pt x="1192023" y="3317218"/>
+                  <a:pt x="1166732" y="3312160"/>
+                </a:cubicBezTo>
+                <a:cubicBezTo>
+                  <a:pt x="1066407" y="3292095"/>
+                  <a:pt x="1165382" y="3315097"/>
+                  <a:pt x="1065132" y="3281680"/>
+                </a:cubicBezTo>
+                <a:cubicBezTo>
+                  <a:pt x="1031589" y="3270499"/>
+                  <a:pt x="997075" y="3262381"/>
+                  <a:pt x="963532" y="3251200"/>
+                </a:cubicBezTo>
+                <a:cubicBezTo>
+                  <a:pt x="946230" y="3245433"/>
+                  <a:pt x="930565" y="3234701"/>
+                  <a:pt x="912732" y="3230880"/>
+                </a:cubicBezTo>
+                <a:cubicBezTo>
+                  <a:pt x="882745" y="3224454"/>
+                  <a:pt x="851772" y="3224107"/>
+                  <a:pt x="821292" y="3220720"/>
+                </a:cubicBezTo>
+                <a:cubicBezTo>
+                  <a:pt x="811132" y="3213947"/>
+                  <a:pt x="800748" y="3207497"/>
+                  <a:pt x="790812" y="3200400"/>
+                </a:cubicBezTo>
+                <a:cubicBezTo>
+                  <a:pt x="777033" y="3190558"/>
+                  <a:pt x="764974" y="3178144"/>
+                  <a:pt x="750172" y="3169920"/>
+                </a:cubicBezTo>
+                <a:cubicBezTo>
+                  <a:pt x="734229" y="3161063"/>
+                  <a:pt x="715315" y="3158457"/>
+                  <a:pt x="699372" y="3149600"/>
+                </a:cubicBezTo>
+                <a:cubicBezTo>
+                  <a:pt x="677328" y="3137353"/>
+                  <a:pt x="632327" y="3097460"/>
+                  <a:pt x="618092" y="3078480"/>
+                </a:cubicBezTo>
+                <a:cubicBezTo>
+                  <a:pt x="609005" y="3066363"/>
+                  <a:pt x="604545" y="3051387"/>
+                  <a:pt x="597772" y="3037840"/>
+                </a:cubicBezTo>
+                <a:cubicBezTo>
+                  <a:pt x="584883" y="2973395"/>
+                  <a:pt x="573735" y="2942037"/>
+                  <a:pt x="597772" y="2865120"/>
+                </a:cubicBezTo>
+                <a:cubicBezTo>
+                  <a:pt x="603486" y="2846834"/>
+                  <a:pt x="627144" y="2839974"/>
+                  <a:pt x="638412" y="2824480"/>
+                </a:cubicBezTo>
+                <a:cubicBezTo>
+                  <a:pt x="654472" y="2802398"/>
+                  <a:pt x="666841" y="2777782"/>
+                  <a:pt x="679052" y="2753360"/>
+                </a:cubicBezTo>
+                <a:cubicBezTo>
+                  <a:pt x="690587" y="2730291"/>
+                  <a:pt x="700857" y="2706529"/>
+                  <a:pt x="709532" y="2682240"/>
+                </a:cubicBezTo>
+                <a:cubicBezTo>
+                  <a:pt x="726117" y="2635803"/>
+                  <a:pt x="736794" y="2576665"/>
+                  <a:pt x="750172" y="2529840"/>
+                </a:cubicBezTo>
+                <a:cubicBezTo>
+                  <a:pt x="754913" y="2513246"/>
+                  <a:pt x="780713" y="2436259"/>
+                  <a:pt x="790812" y="2418080"/>
+                </a:cubicBezTo>
+                <a:cubicBezTo>
+                  <a:pt x="799036" y="2403278"/>
+                  <a:pt x="813719" y="2392586"/>
+                  <a:pt x="821292" y="2377440"/>
+                </a:cubicBezTo>
+                <a:cubicBezTo>
+                  <a:pt x="837604" y="2344815"/>
+                  <a:pt x="861932" y="2275840"/>
+                  <a:pt x="861932" y="2275840"/>
+                </a:cubicBezTo>
+                <a:cubicBezTo>
+                  <a:pt x="855159" y="2174240"/>
+                  <a:pt x="856717" y="2071739"/>
+                  <a:pt x="841612" y="1971040"/>
+                </a:cubicBezTo>
+                <a:cubicBezTo>
+                  <a:pt x="836201" y="1934968"/>
+                  <a:pt x="814519" y="1903307"/>
+                  <a:pt x="800972" y="1869440"/>
+                </a:cubicBezTo>
+                <a:lnTo>
+                  <a:pt x="780652" y="1818640"/>
+                </a:lnTo>
+                <a:cubicBezTo>
+                  <a:pt x="762228" y="1772580"/>
+                  <a:pt x="745624" y="1722652"/>
+                  <a:pt x="709532" y="1686560"/>
+                </a:cubicBezTo>
+                <a:cubicBezTo>
+                  <a:pt x="700898" y="1677926"/>
+                  <a:pt x="689212" y="1673013"/>
+                  <a:pt x="679052" y="1666240"/>
+                </a:cubicBezTo>
+                <a:cubicBezTo>
+                  <a:pt x="633356" y="1597695"/>
+                  <a:pt x="647235" y="1598262"/>
+                  <a:pt x="496172" y="1666240"/>
+                </a:cubicBezTo>
+                <a:cubicBezTo>
+                  <a:pt x="473901" y="1676262"/>
+                  <a:pt x="455532" y="1727200"/>
+                  <a:pt x="455532" y="1727200"/>
+                </a:cubicBezTo>
+                <a:cubicBezTo>
+                  <a:pt x="462305" y="1761067"/>
+                  <a:pt x="463725" y="1796462"/>
+                  <a:pt x="475852" y="1828800"/>
+                </a:cubicBezTo>
+                <a:cubicBezTo>
+                  <a:pt x="484427" y="1851667"/>
+                  <a:pt x="505570" y="1867917"/>
+                  <a:pt x="516492" y="1889760"/>
+                </a:cubicBezTo>
+                <a:cubicBezTo>
+                  <a:pt x="577897" y="2012570"/>
+                  <a:pt x="499689" y="1860355"/>
+                  <a:pt x="557132" y="1960880"/>
+                </a:cubicBezTo>
+                <a:cubicBezTo>
+                  <a:pt x="564646" y="1974030"/>
+                  <a:pt x="568649" y="1989195"/>
+                  <a:pt x="577452" y="2001520"/>
+                </a:cubicBezTo>
+                <a:cubicBezTo>
+                  <a:pt x="585803" y="2013212"/>
+                  <a:pt x="599581" y="2020308"/>
+                  <a:pt x="607932" y="2032000"/>
+                </a:cubicBezTo>
+                <a:cubicBezTo>
+                  <a:pt x="616735" y="2044325"/>
+                  <a:pt x="617542" y="2061930"/>
+                  <a:pt x="628252" y="2072640"/>
+                </a:cubicBezTo>
+                <a:cubicBezTo>
+                  <a:pt x="633111" y="2077499"/>
+                  <a:pt x="699020" y="2092872"/>
+                  <a:pt x="699372" y="2092960"/>
+                </a:cubicBezTo>
+                <a:cubicBezTo>
+                  <a:pt x="733239" y="2079413"/>
+                  <a:pt x="771792" y="2074205"/>
+                  <a:pt x="800972" y="2052320"/>
+                </a:cubicBezTo>
+                <a:cubicBezTo>
+                  <a:pt x="817775" y="2039718"/>
+                  <a:pt x="885555" y="1935606"/>
+                  <a:pt x="902572" y="1910080"/>
+                </a:cubicBezTo>
+                <a:cubicBezTo>
+                  <a:pt x="912732" y="1876213"/>
+                  <a:pt x="926118" y="1843151"/>
+                  <a:pt x="933052" y="1808480"/>
+                </a:cubicBezTo>
+                <a:cubicBezTo>
+                  <a:pt x="945784" y="1744818"/>
+                  <a:pt x="947550" y="1688423"/>
+                  <a:pt x="933052" y="1625600"/>
+                </a:cubicBezTo>
+                <a:cubicBezTo>
+                  <a:pt x="922060" y="1577967"/>
+                  <a:pt x="909175" y="1571852"/>
+                  <a:pt x="882252" y="1534160"/>
+                </a:cubicBezTo>
+                <a:cubicBezTo>
+                  <a:pt x="875155" y="1524224"/>
+                  <a:pt x="868705" y="1513840"/>
+                  <a:pt x="861932" y="1503680"/>
+                </a:cubicBezTo>
+                <a:cubicBezTo>
+                  <a:pt x="838225" y="1510453"/>
+                  <a:pt x="813983" y="1515574"/>
+                  <a:pt x="790812" y="1524000"/>
+                </a:cubicBezTo>
+                <a:cubicBezTo>
+                  <a:pt x="776578" y="1529176"/>
+                  <a:pt x="764540" y="1539531"/>
+                  <a:pt x="750172" y="1544320"/>
+                </a:cubicBezTo>
+                <a:cubicBezTo>
+                  <a:pt x="733789" y="1549781"/>
+                  <a:pt x="716198" y="1550597"/>
+                  <a:pt x="699372" y="1554480"/>
+                </a:cubicBezTo>
+                <a:cubicBezTo>
+                  <a:pt x="672160" y="1560760"/>
+                  <a:pt x="618092" y="1574800"/>
+                  <a:pt x="618092" y="1574800"/>
+                </a:cubicBezTo>
+                <a:cubicBezTo>
+                  <a:pt x="604545" y="1584960"/>
+                  <a:pt x="592926" y="1598403"/>
+                  <a:pt x="577452" y="1605280"/>
+                </a:cubicBezTo>
+                <a:cubicBezTo>
+                  <a:pt x="561672" y="1612293"/>
+                  <a:pt x="541221" y="1606169"/>
+                  <a:pt x="526652" y="1615440"/>
+                </a:cubicBezTo>
+                <a:cubicBezTo>
+                  <a:pt x="375880" y="1711386"/>
+                  <a:pt x="523603" y="1657096"/>
+                  <a:pt x="435212" y="1686560"/>
+                </a:cubicBezTo>
+                <a:cubicBezTo>
+                  <a:pt x="421665" y="1703493"/>
+                  <a:pt x="407583" y="1720012"/>
+                  <a:pt x="394572" y="1737360"/>
+                </a:cubicBezTo>
+                <a:cubicBezTo>
+                  <a:pt x="378935" y="1758209"/>
+                  <a:pt x="355246" y="1799517"/>
+                  <a:pt x="343772" y="1818640"/>
+                </a:cubicBezTo>
+                <a:cubicBezTo>
+                  <a:pt x="359138" y="2156702"/>
+                  <a:pt x="311799" y="1963347"/>
+                  <a:pt x="374252" y="2072640"/>
+                </a:cubicBezTo>
+                <a:cubicBezTo>
+                  <a:pt x="381155" y="2084721"/>
+                  <a:pt x="401390" y="2132509"/>
+                  <a:pt x="414892" y="2143760"/>
+                </a:cubicBezTo>
+                <a:cubicBezTo>
+                  <a:pt x="426527" y="2153456"/>
+                  <a:pt x="441985" y="2157307"/>
+                  <a:pt x="455532" y="2164080"/>
+                </a:cubicBezTo>
+                <a:cubicBezTo>
+                  <a:pt x="472465" y="2160693"/>
+                  <a:pt x="491964" y="2163499"/>
+                  <a:pt x="506332" y="2153920"/>
+                </a:cubicBezTo>
+                <a:cubicBezTo>
+                  <a:pt x="515243" y="2147979"/>
+                  <a:pt x="512373" y="2133326"/>
+                  <a:pt x="516492" y="2123440"/>
+                </a:cubicBezTo>
+                <a:cubicBezTo>
+                  <a:pt x="529321" y="2092651"/>
+                  <a:pt x="545420" y="2063231"/>
+                  <a:pt x="557132" y="2032000"/>
+                </a:cubicBezTo>
+                <a:cubicBezTo>
+                  <a:pt x="633453" y="1828477"/>
+                  <a:pt x="623196" y="1859184"/>
+                  <a:pt x="658732" y="1717040"/>
+                </a:cubicBezTo>
+                <a:cubicBezTo>
+                  <a:pt x="654988" y="1668365"/>
+                  <a:pt x="667744" y="1576719"/>
+                  <a:pt x="618092" y="1534160"/>
+                </a:cubicBezTo>
+                <a:cubicBezTo>
+                  <a:pt x="607490" y="1525073"/>
+                  <a:pt x="590999" y="1527387"/>
+                  <a:pt x="577452" y="1524000"/>
+                </a:cubicBezTo>
+                <a:cubicBezTo>
+                  <a:pt x="496080" y="1535625"/>
+                  <a:pt x="459901" y="1535815"/>
+                  <a:pt x="394572" y="1554480"/>
+                </a:cubicBezTo>
+                <a:cubicBezTo>
+                  <a:pt x="384274" y="1557422"/>
+                  <a:pt x="373936" y="1560421"/>
+                  <a:pt x="364092" y="1564640"/>
+                </a:cubicBezTo>
+                <a:cubicBezTo>
+                  <a:pt x="350171" y="1570606"/>
+                  <a:pt x="336602" y="1577446"/>
+                  <a:pt x="323452" y="1584960"/>
+                </a:cubicBezTo>
+                <a:cubicBezTo>
+                  <a:pt x="312850" y="1591018"/>
+                  <a:pt x="302098" y="1597168"/>
+                  <a:pt x="292972" y="1605280"/>
+                </a:cubicBezTo>
+                <a:cubicBezTo>
+                  <a:pt x="271494" y="1624372"/>
+                  <a:pt x="244863" y="1640537"/>
+                  <a:pt x="232012" y="1666240"/>
+                </a:cubicBezTo>
+                <a:cubicBezTo>
+                  <a:pt x="225239" y="1679787"/>
+                  <a:pt x="217317" y="1692818"/>
+                  <a:pt x="211692" y="1706880"/>
+                </a:cubicBezTo>
+                <a:cubicBezTo>
+                  <a:pt x="161473" y="1832427"/>
+                  <a:pt x="218706" y="1713172"/>
+                  <a:pt x="171052" y="1808480"/>
+                </a:cubicBezTo>
+                <a:cubicBezTo>
+                  <a:pt x="173655" y="1878751"/>
+                  <a:pt x="106146" y="2060902"/>
+                  <a:pt x="211692" y="2103120"/>
+                </a:cubicBezTo>
+                <a:cubicBezTo>
+                  <a:pt x="234584" y="2112277"/>
+                  <a:pt x="259105" y="2116667"/>
+                  <a:pt x="282812" y="2123440"/>
+                </a:cubicBezTo>
+                <a:cubicBezTo>
+                  <a:pt x="309905" y="2113280"/>
+                  <a:pt x="342003" y="2111651"/>
+                  <a:pt x="364092" y="2092960"/>
+                </a:cubicBezTo>
+                <a:cubicBezTo>
+                  <a:pt x="388482" y="2072322"/>
+                  <a:pt x="398793" y="2039278"/>
+                  <a:pt x="414892" y="2011680"/>
+                </a:cubicBezTo>
+                <a:cubicBezTo>
+                  <a:pt x="422523" y="1998598"/>
+                  <a:pt x="427857" y="1984280"/>
+                  <a:pt x="435212" y="1971040"/>
+                </a:cubicBezTo>
+                <a:cubicBezTo>
+                  <a:pt x="444802" y="1953778"/>
+                  <a:pt x="455532" y="1937173"/>
+                  <a:pt x="465692" y="1920240"/>
+                </a:cubicBezTo>
+                <a:cubicBezTo>
+                  <a:pt x="474485" y="1858687"/>
+                  <a:pt x="486012" y="1787944"/>
+                  <a:pt x="486012" y="1727200"/>
+                </a:cubicBezTo>
+                <a:cubicBezTo>
+                  <a:pt x="486012" y="1686419"/>
+                  <a:pt x="485743" y="1644843"/>
+                  <a:pt x="475852" y="1605280"/>
+                </a:cubicBezTo>
+                <a:cubicBezTo>
+                  <a:pt x="467833" y="1573205"/>
+                  <a:pt x="437981" y="1560812"/>
+                  <a:pt x="414892" y="1544320"/>
+                </a:cubicBezTo>
+                <a:cubicBezTo>
+                  <a:pt x="401113" y="1534478"/>
+                  <a:pt x="387799" y="1524000"/>
+                  <a:pt x="374252" y="1513840"/>
+                </a:cubicBezTo>
+                <a:cubicBezTo>
+                  <a:pt x="320065" y="1520613"/>
+                  <a:pt x="265129" y="1522910"/>
+                  <a:pt x="211692" y="1534160"/>
+                </a:cubicBezTo>
+                <a:cubicBezTo>
+                  <a:pt x="199743" y="1536676"/>
+                  <a:pt x="190981" y="1547154"/>
+                  <a:pt x="181212" y="1554480"/>
+                </a:cubicBezTo>
+                <a:cubicBezTo>
+                  <a:pt x="163864" y="1567491"/>
+                  <a:pt x="147345" y="1581573"/>
+                  <a:pt x="130412" y="1595120"/>
+                </a:cubicBezTo>
+                <a:cubicBezTo>
+                  <a:pt x="69007" y="1717930"/>
+                  <a:pt x="147215" y="1565715"/>
+                  <a:pt x="89772" y="1666240"/>
+                </a:cubicBezTo>
+                <a:cubicBezTo>
+                  <a:pt x="82258" y="1679390"/>
+                  <a:pt x="77244" y="1693893"/>
+                  <a:pt x="69452" y="1706880"/>
+                </a:cubicBezTo>
+                <a:cubicBezTo>
+                  <a:pt x="56887" y="1727821"/>
+                  <a:pt x="28812" y="1767840"/>
+                  <a:pt x="28812" y="1767840"/>
+                </a:cubicBezTo>
+                <a:cubicBezTo>
+                  <a:pt x="-3467" y="1880816"/>
+                  <a:pt x="-11092" y="1878569"/>
+                  <a:pt x="18652" y="2042160"/>
+                </a:cubicBezTo>
+                <a:cubicBezTo>
+                  <a:pt x="20836" y="2054174"/>
+                  <a:pt x="38972" y="2055707"/>
+                  <a:pt x="49132" y="2062480"/>
+                </a:cubicBezTo>
+                <a:cubicBezTo>
+                  <a:pt x="52519" y="2072640"/>
+                  <a:pt x="51719" y="2085387"/>
+                  <a:pt x="59292" y="2092960"/>
+                </a:cubicBezTo>
+                <a:cubicBezTo>
+                  <a:pt x="102651" y="2136319"/>
+                  <a:pt x="111983" y="2103640"/>
+                  <a:pt x="150732" y="2072640"/>
+                </a:cubicBezTo>
+                <a:cubicBezTo>
+                  <a:pt x="167665" y="2028613"/>
+                  <a:pt x="184343" y="1984487"/>
+                  <a:pt x="201532" y="1940560"/>
+                </a:cubicBezTo>
+                <a:cubicBezTo>
+                  <a:pt x="214824" y="1906592"/>
+                  <a:pt x="223406" y="1870237"/>
+                  <a:pt x="242172" y="1838960"/>
+                </a:cubicBezTo>
+                <a:lnTo>
+                  <a:pt x="272652" y="1788160"/>
+                </a:lnTo>
+                <a:cubicBezTo>
+                  <a:pt x="265879" y="1740747"/>
+                  <a:pt x="260206" y="1693163"/>
+                  <a:pt x="252332" y="1645920"/>
+                </a:cubicBezTo>
+                <a:cubicBezTo>
+                  <a:pt x="250036" y="1632146"/>
+                  <a:pt x="247673" y="1618115"/>
+                  <a:pt x="242172" y="1605280"/>
+                </a:cubicBezTo>
+                <a:cubicBezTo>
+                  <a:pt x="237362" y="1594057"/>
+                  <a:pt x="227910" y="1585402"/>
+                  <a:pt x="221852" y="1574800"/>
+                </a:cubicBezTo>
+                <a:cubicBezTo>
+                  <a:pt x="214338" y="1561650"/>
+                  <a:pt x="207683" y="1548000"/>
+                  <a:pt x="201532" y="1534160"/>
+                </a:cubicBezTo>
+                <a:cubicBezTo>
+                  <a:pt x="194125" y="1517494"/>
+                  <a:pt x="190069" y="1499303"/>
+                  <a:pt x="181212" y="1483360"/>
+                </a:cubicBezTo>
+                <a:cubicBezTo>
+                  <a:pt x="172988" y="1468558"/>
+                  <a:pt x="159707" y="1457079"/>
+                  <a:pt x="150732" y="1442720"/>
+                </a:cubicBezTo>
+                <a:cubicBezTo>
+                  <a:pt x="142705" y="1429877"/>
+                  <a:pt x="137185" y="1415627"/>
+                  <a:pt x="130412" y="1402080"/>
+                </a:cubicBezTo>
+                <a:cubicBezTo>
+                  <a:pt x="115225" y="1310956"/>
+                  <a:pt x="112984" y="1352763"/>
+                  <a:pt x="150732" y="1239520"/>
+                </a:cubicBezTo>
+                <a:cubicBezTo>
+                  <a:pt x="156499" y="1222218"/>
+                  <a:pt x="158156" y="1201616"/>
+                  <a:pt x="171052" y="1188720"/>
+                </a:cubicBezTo>
+                <a:cubicBezTo>
+                  <a:pt x="203624" y="1156148"/>
+                  <a:pt x="254532" y="1143800"/>
+                  <a:pt x="282812" y="1107440"/>
+                </a:cubicBezTo>
+                <a:cubicBezTo>
+                  <a:pt x="524275" y="796988"/>
+                  <a:pt x="208752" y="1209092"/>
+                  <a:pt x="404732" y="934720"/>
+                </a:cubicBezTo>
+                <a:cubicBezTo>
+                  <a:pt x="420106" y="913196"/>
+                  <a:pt x="440364" y="895429"/>
+                  <a:pt x="455532" y="873760"/>
+                </a:cubicBezTo>
+                <a:cubicBezTo>
+                  <a:pt x="487855" y="827584"/>
+                  <a:pt x="514392" y="777516"/>
+                  <a:pt x="546972" y="731520"/>
+                </a:cubicBezTo>
+                <a:cubicBezTo>
+                  <a:pt x="607220" y="646464"/>
+                  <a:pt x="623415" y="634757"/>
+                  <a:pt x="689212" y="568960"/>
+                </a:cubicBezTo>
+                <a:cubicBezTo>
+                  <a:pt x="706145" y="572347"/>
+                  <a:pt x="722978" y="581959"/>
+                  <a:pt x="740012" y="579120"/>
+                </a:cubicBezTo>
+                <a:cubicBezTo>
+                  <a:pt x="765453" y="574880"/>
+                  <a:pt x="789672" y="562947"/>
+                  <a:pt x="811132" y="548640"/>
+                </a:cubicBezTo>
+                <a:cubicBezTo>
+                  <a:pt x="851182" y="521940"/>
+                  <a:pt x="890914" y="493175"/>
+                  <a:pt x="922892" y="457200"/>
+                </a:cubicBezTo>
+                <a:cubicBezTo>
+                  <a:pt x="972302" y="401614"/>
+                  <a:pt x="1043287" y="314935"/>
+                  <a:pt x="1105772" y="274320"/>
+                </a:cubicBezTo>
+                <a:cubicBezTo>
+                  <a:pt x="1156755" y="241181"/>
+                  <a:pt x="1230593" y="228842"/>
+                  <a:pt x="1288652" y="213360"/>
+                </a:cubicBezTo>
+                <a:cubicBezTo>
+                  <a:pt x="1498593" y="157376"/>
+                  <a:pt x="1209025" y="230727"/>
+                  <a:pt x="1441052" y="172720"/>
+                </a:cubicBezTo>
+                <a:cubicBezTo>
+                  <a:pt x="1729402" y="6364"/>
+                  <a:pt x="1606591" y="44975"/>
+                  <a:pt x="1786492" y="0"/>
+                </a:cubicBezTo>
+                <a:cubicBezTo>
+                  <a:pt x="1830519" y="3387"/>
+                  <a:pt x="1874904" y="3610"/>
+                  <a:pt x="1918572" y="10160"/>
+                </a:cubicBezTo>
+                <a:cubicBezTo>
+                  <a:pt x="1942955" y="13817"/>
+                  <a:pt x="1965668" y="24936"/>
+                  <a:pt x="1989692" y="30480"/>
+                </a:cubicBezTo>
+                <a:cubicBezTo>
+                  <a:pt x="2009765" y="35112"/>
+                  <a:pt x="2030405" y="36844"/>
+                  <a:pt x="2050652" y="40640"/>
+                </a:cubicBezTo>
+                <a:cubicBezTo>
+                  <a:pt x="2084598" y="47005"/>
+                  <a:pt x="2118385" y="54187"/>
+                  <a:pt x="2152252" y="60960"/>
+                </a:cubicBezTo>
+                <a:cubicBezTo>
+                  <a:pt x="2206439" y="84667"/>
+                  <a:pt x="2258702" y="113377"/>
+                  <a:pt x="2314812" y="132080"/>
+                </a:cubicBezTo>
+                <a:cubicBezTo>
+                  <a:pt x="2618505" y="233311"/>
+                  <a:pt x="2302648" y="124275"/>
+                  <a:pt x="2507852" y="203200"/>
+                </a:cubicBezTo>
+                <a:cubicBezTo>
+                  <a:pt x="2571874" y="227824"/>
+                  <a:pt x="2561050" y="216811"/>
+                  <a:pt x="2619612" y="243840"/>
+                </a:cubicBezTo>
+                <a:cubicBezTo>
+                  <a:pt x="2647115" y="256534"/>
+                  <a:pt x="2675688" y="267677"/>
+                  <a:pt x="2700892" y="284480"/>
+                </a:cubicBezTo>
+                <a:cubicBezTo>
+                  <a:pt x="2736672" y="308333"/>
+                  <a:pt x="2763440" y="329819"/>
+                  <a:pt x="2802492" y="345440"/>
+                </a:cubicBezTo>
+                <a:cubicBezTo>
+                  <a:pt x="2864476" y="370234"/>
+                  <a:pt x="2866503" y="366196"/>
+                  <a:pt x="2934572" y="375920"/>
+                </a:cubicBezTo>
+                <a:cubicBezTo>
+                  <a:pt x="2968439" y="389467"/>
+                  <a:pt x="3015939" y="386211"/>
+                  <a:pt x="3036172" y="416560"/>
+                </a:cubicBezTo>
+                <a:cubicBezTo>
+                  <a:pt x="3064893" y="459642"/>
+                  <a:pt x="3045570" y="441579"/>
+                  <a:pt x="3097132" y="467360"/>
+                </a:cubicBezTo>
+                <a:cubicBezTo>
+                  <a:pt x="3130347" y="567004"/>
+                  <a:pt x="3076497" y="426248"/>
+                  <a:pt x="3137772" y="518160"/>
+                </a:cubicBezTo>
+                <a:cubicBezTo>
+                  <a:pt x="3145518" y="529778"/>
+                  <a:pt x="3144096" y="545374"/>
+                  <a:pt x="3147932" y="558800"/>
+                </a:cubicBezTo>
+                <a:cubicBezTo>
+                  <a:pt x="3163447" y="613102"/>
+                  <a:pt x="3158092" y="566305"/>
+                  <a:pt x="3158092" y="640080"/>
+                </a:cubicBezTo>
+              </a:path>
+            </a:pathLst>
+          </a:custGeom>
+          <a:noFill/>
+          <a:ln w="28575">
+            <a:solidFill>
+              <a:srgbClr val="FF0000"/>
+            </a:solidFill>
+            <a:prstDash val="sysDash"/>
+          </a:ln>
+        </p:spPr>
+        <p:style>
+          <a:lnRef idx="2">
+            <a:schemeClr val="accent1">
+              <a:shade val="15000"/>
+            </a:schemeClr>
+          </a:lnRef>
+          <a:fillRef idx="1">
+            <a:schemeClr val="accent1"/>
+          </a:fillRef>
+          <a:effectRef idx="0">
+            <a:schemeClr val="accent1"/>
+          </a:effectRef>
+          <a:fontRef idx="minor">
+            <a:schemeClr val="lt1"/>
+          </a:fontRef>
+        </p:style>
+        <p:txBody>
+          <a:bodyPr rtlCol="0" anchor="ctr"/>
+          <a:lstStyle/>
+          <a:p>
+            <a:pPr algn="ctr"/>
+            <a:endParaRPr lang="en-US"/>
+          </a:p>
+        </p:txBody>
+      </p:sp>
+      <p:sp>
+        <p:nvSpPr>
+          <p:cNvPr id="12" name="Arrow: Right 11">
+            <a:extLst>
+              <a:ext uri="{FF2B5EF4-FFF2-40B4-BE49-F238E27FC236}">
+                <a16:creationId xmlns:a16="http://schemas.microsoft.com/office/drawing/2014/main" id="{E648FD82-2A2A-5F77-4F17-206DE172F8DF}"/>
+              </a:ext>
+            </a:extLst>
+          </p:cNvPr>
+          <p:cNvSpPr/>
+          <p:nvPr/>
+        </p:nvSpPr>
+        <p:spPr>
+          <a:xfrm>
+            <a:off x="4236720" y="3149600"/>
+            <a:ext cx="1178560" cy="279400"/>
+          </a:xfrm>
+          <a:prstGeom prst="rightArrow">
+            <a:avLst/>
+          </a:prstGeom>
+          <a:solidFill>
+            <a:srgbClr val="FF0000"/>
+          </a:solidFill>
+        </p:spPr>
+        <p:style>
+          <a:lnRef idx="2">
+            <a:schemeClr val="accent1">
+              <a:shade val="15000"/>
+            </a:schemeClr>
+          </a:lnRef>
+          <a:fillRef idx="1">
+            <a:schemeClr val="accent1"/>
+          </a:fillRef>
+          <a:effectRef idx="0">
+            <a:schemeClr val="accent1"/>
+          </a:effectRef>
+          <a:fontRef idx="minor">
+            <a:schemeClr val="lt1"/>
+          </a:fontRef>
+        </p:style>
+        <p:txBody>
+          <a:bodyPr rtlCol="0" anchor="ctr"/>
+          <a:lstStyle/>
+          <a:p>
+            <a:pPr algn="ctr"/>
+            <a:endParaRPr lang="en-US"/>
+          </a:p>
+        </p:txBody>
+      </p:sp>
+      <p:sp>
+        <p:nvSpPr>
+          <p:cNvPr id="13" name="TextBox 12">
+            <a:extLst>
+              <a:ext uri="{FF2B5EF4-FFF2-40B4-BE49-F238E27FC236}">
+                <a16:creationId xmlns:a16="http://schemas.microsoft.com/office/drawing/2014/main" id="{3352BC8A-B321-80DF-7AC7-A2C8CD4DADA8}"/>
+              </a:ext>
+            </a:extLst>
+          </p:cNvPr>
+          <p:cNvSpPr txBox="1"/>
+          <p:nvPr/>
+        </p:nvSpPr>
+        <p:spPr>
+          <a:xfrm>
+            <a:off x="8483600" y="345440"/>
+            <a:ext cx="2499360" cy="923330"/>
+          </a:xfrm>
+          <a:prstGeom prst="rect">
+            <a:avLst/>
+          </a:prstGeom>
+          <a:noFill/>
+        </p:spPr>
+        <p:txBody>
+          <a:bodyPr wrap="square" rtlCol="0">
+            <a:spAutoFit/>
+          </a:bodyPr>
+          <a:lstStyle/>
+          <a:p>
+            <a:pPr algn="ctr"/>
+            <a:r>
+              <a:rPr lang="en-US" dirty="0"/>
+              <a:t>Sound Data</a:t>
+            </a:r>
+          </a:p>
+          <a:p>
+            <a:pPr algn="ctr"/>
+            <a:r>
+              <a:rPr lang="en-US" dirty="0"/>
+              <a:t>or</a:t>
+            </a:r>
+          </a:p>
+          <a:p>
+            <a:pPr algn="ctr"/>
+            <a:r>
+              <a:rPr lang="en-US" dirty="0"/>
+              <a:t>Electrical Current</a:t>
+            </a:r>
+          </a:p>
+        </p:txBody>
+      </p:sp>
+      <p:sp>
+        <p:nvSpPr>
+          <p:cNvPr id="14" name="TextBox 13">
+            <a:extLst>
+              <a:ext uri="{FF2B5EF4-FFF2-40B4-BE49-F238E27FC236}">
+                <a16:creationId xmlns:a16="http://schemas.microsoft.com/office/drawing/2014/main" id="{4CABF47F-E959-A175-B0F5-D0E36D9F577E}"/>
+              </a:ext>
+            </a:extLst>
+          </p:cNvPr>
+          <p:cNvSpPr txBox="1"/>
+          <p:nvPr/>
+        </p:nvSpPr>
+        <p:spPr>
+          <a:xfrm>
+            <a:off x="5552440" y="483939"/>
+            <a:ext cx="1833880" cy="646331"/>
+          </a:xfrm>
+          <a:prstGeom prst="rect">
+            <a:avLst/>
+          </a:prstGeom>
+          <a:noFill/>
+        </p:spPr>
+        <p:txBody>
+          <a:bodyPr wrap="square" rtlCol="0">
+            <a:spAutoFit/>
+          </a:bodyPr>
+          <a:lstStyle/>
+          <a:p>
+            <a:pPr algn="ctr"/>
+            <a:r>
+              <a:rPr lang="en-US" dirty="0"/>
+              <a:t>Electricity going though wire</a:t>
+            </a:r>
+          </a:p>
+        </p:txBody>
+      </p:sp>
+      <p:sp>
+        <p:nvSpPr>
+          <p:cNvPr id="15" name="TextBox 14">
+            <a:extLst>
+              <a:ext uri="{FF2B5EF4-FFF2-40B4-BE49-F238E27FC236}">
+                <a16:creationId xmlns:a16="http://schemas.microsoft.com/office/drawing/2014/main" id="{AB2F6AD9-EF14-3459-BEE4-DE39EBDC7C7F}"/>
+              </a:ext>
+            </a:extLst>
+          </p:cNvPr>
+          <p:cNvSpPr txBox="1"/>
+          <p:nvPr/>
+        </p:nvSpPr>
+        <p:spPr>
+          <a:xfrm>
+            <a:off x="4136924" y="5361970"/>
+            <a:ext cx="1694916" cy="923330"/>
+          </a:xfrm>
+          <a:prstGeom prst="rect">
+            <a:avLst/>
+          </a:prstGeom>
+          <a:noFill/>
+        </p:spPr>
+        <p:txBody>
+          <a:bodyPr wrap="square" rtlCol="0">
+            <a:spAutoFit/>
+          </a:bodyPr>
+          <a:lstStyle/>
+          <a:p>
+            <a:pPr algn="ctr"/>
+            <a:r>
+              <a:rPr lang="en-US" dirty="0"/>
+              <a:t>Electromagnetic force from electricity</a:t>
+            </a:r>
+          </a:p>
+        </p:txBody>
+      </p:sp>
+      <p:sp>
+        <p:nvSpPr>
+          <p:cNvPr id="16" name="TextBox 15">
+            <a:extLst>
+              <a:ext uri="{FF2B5EF4-FFF2-40B4-BE49-F238E27FC236}">
+                <a16:creationId xmlns:a16="http://schemas.microsoft.com/office/drawing/2014/main" id="{FAC8CA0B-979B-1388-1B67-367E2C942F37}"/>
+              </a:ext>
+            </a:extLst>
+          </p:cNvPr>
+          <p:cNvSpPr txBox="1"/>
+          <p:nvPr/>
+        </p:nvSpPr>
+        <p:spPr>
+          <a:xfrm>
+            <a:off x="2799510" y="373732"/>
+            <a:ext cx="1694916" cy="646331"/>
+          </a:xfrm>
+          <a:prstGeom prst="rect">
+            <a:avLst/>
+          </a:prstGeom>
+          <a:noFill/>
+        </p:spPr>
+        <p:txBody>
+          <a:bodyPr wrap="square" rtlCol="0">
+            <a:spAutoFit/>
+          </a:bodyPr>
+          <a:lstStyle/>
+          <a:p>
+            <a:pPr algn="ctr"/>
+            <a:r>
+              <a:rPr lang="en-US" dirty="0"/>
+              <a:t>Speaker Diaphragm</a:t>
+            </a:r>
+          </a:p>
+        </p:txBody>
+      </p:sp>
+      <p:sp>
+        <p:nvSpPr>
+          <p:cNvPr id="17" name="TextBox 16">
+            <a:extLst>
+              <a:ext uri="{FF2B5EF4-FFF2-40B4-BE49-F238E27FC236}">
+                <a16:creationId xmlns:a16="http://schemas.microsoft.com/office/drawing/2014/main" id="{D7A3BA56-B402-CA3B-9D7E-65F9EE4C9C31}"/>
+              </a:ext>
+            </a:extLst>
+          </p:cNvPr>
+          <p:cNvSpPr txBox="1"/>
+          <p:nvPr/>
+        </p:nvSpPr>
+        <p:spPr>
+          <a:xfrm>
+            <a:off x="625270" y="699863"/>
+            <a:ext cx="1694916" cy="369332"/>
+          </a:xfrm>
+          <a:prstGeom prst="rect">
+            <a:avLst/>
+          </a:prstGeom>
+          <a:noFill/>
+        </p:spPr>
+        <p:txBody>
+          <a:bodyPr wrap="square" rtlCol="0">
+            <a:spAutoFit/>
+          </a:bodyPr>
+          <a:lstStyle/>
+          <a:p>
+            <a:pPr algn="ctr"/>
+            <a:r>
+              <a:rPr lang="en-US" dirty="0"/>
+              <a:t>Sound Waves</a:t>
+            </a:r>
+          </a:p>
+        </p:txBody>
+      </p:sp>
+      <p:cxnSp>
+        <p:nvCxnSpPr>
+          <p:cNvPr id="19" name="Straight Connector 18">
+            <a:extLst>
+              <a:ext uri="{FF2B5EF4-FFF2-40B4-BE49-F238E27FC236}">
+                <a16:creationId xmlns:a16="http://schemas.microsoft.com/office/drawing/2014/main" id="{FA121141-74BA-9F9B-D7FC-1A345F1AA2B7}"/>
+              </a:ext>
+            </a:extLst>
+          </p:cNvPr>
+          <p:cNvCxnSpPr>
+            <a:cxnSpLocks/>
+            <a:stCxn id="17" idx="2"/>
+          </p:cNvCxnSpPr>
+          <p:nvPr/>
+        </p:nvCxnSpPr>
+        <p:spPr>
+          <a:xfrm>
+            <a:off x="1472728" y="1069195"/>
+            <a:ext cx="0" cy="556405"/>
+          </a:xfrm>
+          <a:prstGeom prst="line">
+            <a:avLst/>
+          </a:prstGeom>
+          <a:ln w="50800"/>
+        </p:spPr>
+        <p:style>
+          <a:lnRef idx="1">
+            <a:schemeClr val="accent1"/>
+          </a:lnRef>
+          <a:fillRef idx="0">
+            <a:schemeClr val="accent1"/>
+          </a:fillRef>
+          <a:effectRef idx="0">
+            <a:schemeClr val="accent1"/>
+          </a:effectRef>
+          <a:fontRef idx="minor">
+            <a:schemeClr val="tx1"/>
+          </a:fontRef>
+        </p:style>
+      </p:cxnSp>
+      <p:cxnSp>
+        <p:nvCxnSpPr>
+          <p:cNvPr id="21" name="Straight Connector 20">
+            <a:extLst>
+              <a:ext uri="{FF2B5EF4-FFF2-40B4-BE49-F238E27FC236}">
+                <a16:creationId xmlns:a16="http://schemas.microsoft.com/office/drawing/2014/main" id="{8AE6D8F4-B3ED-3E30-749D-0AEFBC75F86E}"/>
+              </a:ext>
+            </a:extLst>
+          </p:cNvPr>
+          <p:cNvCxnSpPr>
+            <a:cxnSpLocks/>
+          </p:cNvCxnSpPr>
+          <p:nvPr/>
+        </p:nvCxnSpPr>
+        <p:spPr>
+          <a:xfrm>
+            <a:off x="3646968" y="1069195"/>
+            <a:ext cx="0" cy="1656037"/>
+          </a:xfrm>
+          <a:prstGeom prst="line">
+            <a:avLst/>
+          </a:prstGeom>
+          <a:ln w="50800"/>
+        </p:spPr>
+        <p:style>
+          <a:lnRef idx="1">
+            <a:schemeClr val="accent1"/>
+          </a:lnRef>
+          <a:fillRef idx="0">
+            <a:schemeClr val="accent1"/>
+          </a:fillRef>
+          <a:effectRef idx="0">
+            <a:schemeClr val="accent1"/>
+          </a:effectRef>
+          <a:fontRef idx="minor">
+            <a:schemeClr val="tx1"/>
+          </a:fontRef>
+        </p:style>
+      </p:cxnSp>
+      <p:cxnSp>
+        <p:nvCxnSpPr>
+          <p:cNvPr id="23" name="Straight Connector 22">
+            <a:extLst>
+              <a:ext uri="{FF2B5EF4-FFF2-40B4-BE49-F238E27FC236}">
+                <a16:creationId xmlns:a16="http://schemas.microsoft.com/office/drawing/2014/main" id="{15F4D88D-D135-5D22-422A-7BCC8841AE50}"/>
+              </a:ext>
+            </a:extLst>
+          </p:cNvPr>
+          <p:cNvCxnSpPr>
+            <a:cxnSpLocks/>
+          </p:cNvCxnSpPr>
+          <p:nvPr/>
+        </p:nvCxnSpPr>
+        <p:spPr>
+          <a:xfrm>
+            <a:off x="4825528" y="3630908"/>
+            <a:ext cx="0" cy="1656037"/>
+          </a:xfrm>
+          <a:prstGeom prst="line">
+            <a:avLst/>
+          </a:prstGeom>
+          <a:ln w="50800"/>
+        </p:spPr>
+        <p:style>
+          <a:lnRef idx="1">
+            <a:schemeClr val="accent1"/>
+          </a:lnRef>
+          <a:fillRef idx="0">
+            <a:schemeClr val="accent1"/>
+          </a:fillRef>
+          <a:effectRef idx="0">
+            <a:schemeClr val="accent1"/>
+          </a:effectRef>
+          <a:fontRef idx="minor">
+            <a:schemeClr val="tx1"/>
+          </a:fontRef>
+        </p:style>
+      </p:cxnSp>
+      <p:cxnSp>
+        <p:nvCxnSpPr>
+          <p:cNvPr id="24" name="Straight Connector 23">
+            <a:extLst>
+              <a:ext uri="{FF2B5EF4-FFF2-40B4-BE49-F238E27FC236}">
+                <a16:creationId xmlns:a16="http://schemas.microsoft.com/office/drawing/2014/main" id="{B9CAE7A0-054C-4B72-E913-4E17323ED77F}"/>
+              </a:ext>
+            </a:extLst>
+          </p:cNvPr>
+          <p:cNvCxnSpPr>
+            <a:cxnSpLocks/>
+          </p:cNvCxnSpPr>
+          <p:nvPr/>
+        </p:nvCxnSpPr>
+        <p:spPr>
+          <a:xfrm>
+            <a:off x="9732808" y="1268770"/>
+            <a:ext cx="472" cy="628443"/>
+          </a:xfrm>
+          <a:prstGeom prst="line">
+            <a:avLst/>
+          </a:prstGeom>
+          <a:ln w="50800"/>
+        </p:spPr>
+        <p:style>
+          <a:lnRef idx="1">
+            <a:schemeClr val="accent1"/>
+          </a:lnRef>
+          <a:fillRef idx="0">
+            <a:schemeClr val="accent1"/>
+          </a:fillRef>
+          <a:effectRef idx="0">
+            <a:schemeClr val="accent1"/>
+          </a:effectRef>
+          <a:fontRef idx="minor">
+            <a:schemeClr val="tx1"/>
+          </a:fontRef>
+        </p:style>
+      </p:cxnSp>
+      <p:cxnSp>
+        <p:nvCxnSpPr>
+          <p:cNvPr id="26" name="Straight Connector 25">
+            <a:extLst>
+              <a:ext uri="{FF2B5EF4-FFF2-40B4-BE49-F238E27FC236}">
+                <a16:creationId xmlns:a16="http://schemas.microsoft.com/office/drawing/2014/main" id="{01FF0B77-BA0C-F942-D668-893BB83D3B66}"/>
+              </a:ext>
+            </a:extLst>
+          </p:cNvPr>
+          <p:cNvCxnSpPr>
+            <a:cxnSpLocks/>
+          </p:cNvCxnSpPr>
+          <p:nvPr/>
+        </p:nvCxnSpPr>
+        <p:spPr>
+          <a:xfrm>
+            <a:off x="6469380" y="1165611"/>
+            <a:ext cx="0" cy="250554"/>
+          </a:xfrm>
+          <a:prstGeom prst="line">
+            <a:avLst/>
+          </a:prstGeom>
+          <a:ln w="50800"/>
+        </p:spPr>
+        <p:style>
+          <a:lnRef idx="1">
+            <a:schemeClr val="accent1"/>
+          </a:lnRef>
+          <a:fillRef idx="0">
+            <a:schemeClr val="accent1"/>
+          </a:fillRef>
+          <a:effectRef idx="0">
+            <a:schemeClr val="accent1"/>
+          </a:effectRef>
+          <a:fontRef idx="minor">
+            <a:schemeClr val="tx1"/>
+          </a:fontRef>
+        </p:style>
+      </p:cxnSp>
+    </p:spTree>
+    <p:extLst>
+      <p:ext uri="{BB962C8B-B14F-4D97-AF65-F5344CB8AC3E}">
+        <p14:creationId xmlns:p14="http://schemas.microsoft.com/office/powerpoint/2010/main" val="1596434228"/>
+      </p:ext>
+    </p:extLst>
+  </p:cSld>
+  <p:clrMapOvr>
+    <a:masterClrMapping/>
+  </p:clrMapOvr>
+</p:sld>
+</file>
+
+<file path=ppt/slides/slide4.xml><?xml version="1.0" encoding="utf-8"?>
+<p:sld xmlns:a="http://schemas.openxmlformats.org/drawingml/2006/main" xmlns:r="http://schemas.openxmlformats.org/officeDocument/2006/relationships" xmlns:p="http://schemas.openxmlformats.org/presentationml/2006/main">
+  <p:cSld>
+    <p:spTree>
+      <p:nvGrpSpPr>
+        <p:cNvPr id="1" name=""/>
+        <p:cNvGrpSpPr/>
+        <p:nvPr/>
+      </p:nvGrpSpPr>
+      <p:grpSpPr>
+        <a:xfrm>
+          <a:off x="0" y="0"/>
+          <a:ext cx="0" cy="0"/>
+          <a:chOff x="0" y="0"/>
+          <a:chExt cx="0" cy="0"/>
+        </a:xfrm>
+      </p:grpSpPr>
+      <p:sp>
+        <p:nvSpPr>
+          <p:cNvPr id="2" name="Title 1">
+            <a:extLst>
+              <a:ext uri="{FF2B5EF4-FFF2-40B4-BE49-F238E27FC236}">
+                <a16:creationId xmlns:a16="http://schemas.microsoft.com/office/drawing/2014/main" id="{F07E2E8C-1240-36AE-096B-0E14854DC9C1}"/>
+              </a:ext>
+            </a:extLst>
+          </p:cNvPr>
+          <p:cNvSpPr>
+            <a:spLocks noGrp="1"/>
+          </p:cNvSpPr>
+          <p:nvPr>
+            <p:ph type="title"/>
+          </p:nvPr>
+        </p:nvSpPr>
+        <p:spPr/>
+        <p:txBody>
+          <a:bodyPr/>
+          <a:lstStyle/>
+          <a:p>
+            <a:endParaRPr lang="en-US"/>
+          </a:p>
+        </p:txBody>
+      </p:sp>
+      <p:sp>
+        <p:nvSpPr>
+          <p:cNvPr id="3" name="Content Placeholder 2">
+            <a:extLst>
+              <a:ext uri="{FF2B5EF4-FFF2-40B4-BE49-F238E27FC236}">
+                <a16:creationId xmlns:a16="http://schemas.microsoft.com/office/drawing/2014/main" id="{7CF004BC-F739-5643-ACD3-F3D6CE5A2B15}"/>
+              </a:ext>
+            </a:extLst>
+          </p:cNvPr>
+          <p:cNvSpPr>
+            <a:spLocks noGrp="1"/>
+          </p:cNvSpPr>
+          <p:nvPr>
+            <p:ph idx="1"/>
+          </p:nvPr>
+        </p:nvSpPr>
+        <p:spPr/>
+        <p:txBody>
+          <a:bodyPr/>
+          <a:lstStyle/>
+          <a:p>
+            <a:endParaRPr lang="en-US" dirty="0"/>
+          </a:p>
+        </p:txBody>
+      </p:sp>
+      <p:pic>
+        <p:nvPicPr>
+          <p:cNvPr id="4" name="Picture 3" descr="Icon&#10;&#10;Description automatically generated">
+            <a:extLst>
+              <a:ext uri="{FF2B5EF4-FFF2-40B4-BE49-F238E27FC236}">
+                <a16:creationId xmlns:a16="http://schemas.microsoft.com/office/drawing/2014/main" id="{0B08D713-15E0-4E15-EC59-B137E498BD11}"/>
+              </a:ext>
+            </a:extLst>
+          </p:cNvPr>
+          <p:cNvPicPr>
+            <a:picLocks noChangeAspect="1"/>
+          </p:cNvPicPr>
+          <p:nvPr/>
+        </p:nvPicPr>
+        <p:blipFill rotWithShape="1">
+          <a:blip r:embed="rId2">
+            <a:extLst>
+              <a:ext uri="{28A0092B-C50C-407E-A947-70E740481C1C}">
+                <a14:useLocalDpi xmlns:a14="http://schemas.microsoft.com/office/drawing/2010/main" val="0"/>
+              </a:ext>
+            </a:extLst>
+          </a:blip>
+          <a:srcRect r="18277"/>
+          <a:stretch/>
+        </p:blipFill>
+        <p:spPr>
+          <a:xfrm>
+            <a:off x="3947159" y="2671375"/>
+            <a:ext cx="4297680" cy="4075591"/>
+          </a:xfrm>
+          <a:prstGeom prst="rect">
+            <a:avLst/>
+          </a:prstGeom>
+        </p:spPr>
+      </p:pic>
+    </p:spTree>
+    <p:extLst>
+      <p:ext uri="{BB962C8B-B14F-4D97-AF65-F5344CB8AC3E}">
+        <p14:creationId xmlns:p14="http://schemas.microsoft.com/office/powerpoint/2010/main" val="1602278617"/>
+      </p:ext>
+    </p:extLst>
+  </p:cSld>
+  <p:clrMapOvr>
+    <a:masterClrMapping/>
+  </p:clrMapOvr>
+</p:sld>
+</file>
+
 <file path=ppt/theme/theme1.xml><?xml version="1.0" encoding="utf-8"?>
 <a:theme xmlns:a="http://schemas.openxmlformats.org/drawingml/2006/main" name="Office Theme">
   <a:themeElements>

</xml_diff>